<commit_message>
3rd version of slide set for IETF 113
</commit_message>
<xml_diff>
--- a/presentations/slides-113-BRSKI-AE.pptx
+++ b/presentations/slides-113-BRSKI-AE.pptx
@@ -38,7 +38,7 @@
       </p:grpSpPr>
       <p:sp>
         <p:nvSpPr>
-          <p:cNvPr id="76" name="PlaceHolder 1"/>
+          <p:cNvPr id="80" name="PlaceHolder 1"/>
           <p:cNvSpPr>
             <a:spLocks noGrp="1"/>
           </p:cNvSpPr>
@@ -171,7 +171,7 @@
       </p:sp>
       <p:sp>
         <p:nvSpPr>
-          <p:cNvPr id="77" name="PlaceHolder 2"/>
+          <p:cNvPr id="81" name="PlaceHolder 2"/>
           <p:cNvSpPr>
             <a:spLocks noGrp="1"/>
           </p:cNvSpPr>
@@ -225,7 +225,7 @@
       </p:sp>
       <p:sp>
         <p:nvSpPr>
-          <p:cNvPr id="78" name="PlaceHolder 3"/>
+          <p:cNvPr id="82" name="PlaceHolder 3"/>
           <p:cNvSpPr>
             <a:spLocks noGrp="1"/>
           </p:cNvSpPr>
@@ -261,7 +261,7 @@
       </p:sp>
       <p:sp>
         <p:nvSpPr>
-          <p:cNvPr id="79" name="PlaceHolder 4"/>
+          <p:cNvPr id="83" name="PlaceHolder 4"/>
           <p:cNvSpPr>
             <a:spLocks noGrp="1"/>
           </p:cNvSpPr>
@@ -298,7 +298,7 @@
       </p:sp>
       <p:sp>
         <p:nvSpPr>
-          <p:cNvPr id="80" name="PlaceHolder 5"/>
+          <p:cNvPr id="84" name="PlaceHolder 5"/>
           <p:cNvSpPr>
             <a:spLocks noGrp="1"/>
           </p:cNvSpPr>
@@ -334,7 +334,7 @@
       </p:sp>
       <p:sp>
         <p:nvSpPr>
-          <p:cNvPr id="81" name="PlaceHolder 6"/>
+          <p:cNvPr id="85" name="PlaceHolder 6"/>
           <p:cNvSpPr>
             <a:spLocks noGrp="1"/>
           </p:cNvSpPr>
@@ -357,7 +357,7 @@
           </a:bodyPr>
           <a:p>
             <a:pPr algn="r"/>
-            <a:fld id="{C5611FBA-9E39-4A6E-9B0E-182EF75C67CC}" type="slidenum">
+            <a:fld id="{90349DC9-C9EC-4114-B6D5-21020041003E}" type="slidenum">
               <a:rPr b="0" lang="en-US" sz="1400" spc="-1" strike="noStrike">
                 <a:latin typeface="Times New Roman"/>
               </a:rPr>
@@ -405,7 +405,7 @@
         <p:spPr>
           <a:xfrm>
             <a:off x="685800" y="1143000"/>
-            <a:ext cx="5485680" cy="3085560"/>
+            <a:ext cx="5485320" cy="3085200"/>
           </a:xfrm>
           <a:prstGeom prst="rect">
             <a:avLst/>
@@ -425,7 +425,7 @@
         <p:spPr>
           <a:xfrm>
             <a:off x="685800" y="4400640"/>
-            <a:ext cx="5485680" cy="3599640"/>
+            <a:ext cx="5485320" cy="3599280"/>
           </a:xfrm>
           <a:prstGeom prst="rect">
             <a:avLst/>
@@ -451,7 +451,7 @@
         <p:spPr>
           <a:xfrm>
             <a:off x="3884760" y="8685360"/>
-            <a:ext cx="2971080" cy="457920"/>
+            <a:ext cx="2970720" cy="457560"/>
           </a:xfrm>
           <a:prstGeom prst="rect">
             <a:avLst/>
@@ -477,8 +477,11 @@
                 <a:spcPct val="100000"/>
               </a:lnSpc>
             </a:pPr>
-            <a:fld id="{836F8F82-3DCF-4456-A2C0-EFD0AA4207D6}" type="slidenum">
+            <a:fld id="{4AFF56FB-D72F-414E-8A04-0ECFE45CEC1C}" type="slidenum">
               <a:rPr b="0" lang="en-US" sz="1200" spc="-1" strike="noStrike">
+                <a:solidFill>
+                  <a:srgbClr val="000000"/>
+                </a:solidFill>
                 <a:latin typeface="Times New Roman"/>
               </a:rPr>
               <a:t>4</a:t>
@@ -524,7 +527,7 @@
         <p:spPr>
           <a:xfrm>
             <a:off x="685800" y="1143000"/>
-            <a:ext cx="5485680" cy="3085560"/>
+            <a:ext cx="5485320" cy="3085200"/>
           </a:xfrm>
           <a:prstGeom prst="rect">
             <a:avLst/>
@@ -544,7 +547,7 @@
         <p:spPr>
           <a:xfrm>
             <a:off x="685800" y="4400640"/>
-            <a:ext cx="5485680" cy="3599640"/>
+            <a:ext cx="5485320" cy="3599280"/>
           </a:xfrm>
           <a:prstGeom prst="rect">
             <a:avLst/>
@@ -570,7 +573,7 @@
         <p:spPr>
           <a:xfrm>
             <a:off x="3884760" y="8685360"/>
-            <a:ext cx="2971080" cy="457920"/>
+            <a:ext cx="2970720" cy="457560"/>
           </a:xfrm>
           <a:prstGeom prst="rect">
             <a:avLst/>
@@ -596,8 +599,11 @@
                 <a:spcPct val="100000"/>
               </a:lnSpc>
             </a:pPr>
-            <a:fld id="{119113FB-E841-4F1B-91E2-090FA98E090A}" type="slidenum">
+            <a:fld id="{0CC5412A-2005-4E01-9515-03F1F2112D44}" type="slidenum">
               <a:rPr b="0" lang="en-US" sz="1200" spc="-1" strike="noStrike">
+                <a:solidFill>
+                  <a:srgbClr val="000000"/>
+                </a:solidFill>
                 <a:latin typeface="Times New Roman"/>
               </a:rPr>
               <a:t>4</a:t>
@@ -643,7 +649,7 @@
         <p:spPr>
           <a:xfrm>
             <a:off x="685800" y="1143000"/>
-            <a:ext cx="5485680" cy="3085560"/>
+            <a:ext cx="5485320" cy="3085200"/>
           </a:xfrm>
           <a:prstGeom prst="rect">
             <a:avLst/>
@@ -663,7 +669,7 @@
         <p:spPr>
           <a:xfrm>
             <a:off x="685800" y="4400640"/>
-            <a:ext cx="5485680" cy="3599640"/>
+            <a:ext cx="5485320" cy="3599280"/>
           </a:xfrm>
           <a:prstGeom prst="rect">
             <a:avLst/>
@@ -689,7 +695,7 @@
         <p:spPr>
           <a:xfrm>
             <a:off x="3884760" y="8685360"/>
-            <a:ext cx="2971080" cy="457920"/>
+            <a:ext cx="2970720" cy="457560"/>
           </a:xfrm>
           <a:prstGeom prst="rect">
             <a:avLst/>
@@ -715,8 +721,11 @@
                 <a:spcPct val="100000"/>
               </a:lnSpc>
             </a:pPr>
-            <a:fld id="{1E0A6A5B-C972-499C-9594-498ED07AB873}" type="slidenum">
+            <a:fld id="{D53F594F-F8EA-43CF-BB4A-D8B762817964}" type="slidenum">
               <a:rPr b="0" lang="en-US" sz="1200" spc="-1" strike="noStrike">
+                <a:solidFill>
+                  <a:srgbClr val="000000"/>
+                </a:solidFill>
                 <a:latin typeface="Times New Roman"/>
               </a:rPr>
               <a:t>4</a:t>
@@ -1314,7 +1323,7 @@
       </p:grpSpPr>
       <p:sp>
         <p:nvSpPr>
-          <p:cNvPr id="40" name="PlaceHolder 1"/>
+          <p:cNvPr id="44" name="PlaceHolder 1"/>
           <p:cNvSpPr>
             <a:spLocks noGrp="1"/>
           </p:cNvSpPr>
@@ -1345,7 +1354,7 @@
       </p:sp>
       <p:sp>
         <p:nvSpPr>
-          <p:cNvPr id="41" name="PlaceHolder 2"/>
+          <p:cNvPr id="45" name="PlaceHolder 2"/>
           <p:cNvSpPr>
             <a:spLocks noGrp="1"/>
           </p:cNvSpPr>
@@ -1398,7 +1407,7 @@
       </p:grpSpPr>
       <p:sp>
         <p:nvSpPr>
-          <p:cNvPr id="42" name="PlaceHolder 1"/>
+          <p:cNvPr id="46" name="PlaceHolder 1"/>
           <p:cNvSpPr>
             <a:spLocks noGrp="1"/>
           </p:cNvSpPr>
@@ -1429,7 +1438,7 @@
       </p:sp>
       <p:sp>
         <p:nvSpPr>
-          <p:cNvPr id="43" name="PlaceHolder 2"/>
+          <p:cNvPr id="47" name="PlaceHolder 2"/>
           <p:cNvSpPr>
             <a:spLocks noGrp="1"/>
           </p:cNvSpPr>
@@ -1481,7 +1490,7 @@
       </p:grpSpPr>
       <p:sp>
         <p:nvSpPr>
-          <p:cNvPr id="44" name="PlaceHolder 1"/>
+          <p:cNvPr id="48" name="PlaceHolder 1"/>
           <p:cNvSpPr>
             <a:spLocks noGrp="1"/>
           </p:cNvSpPr>
@@ -1512,7 +1521,7 @@
       </p:sp>
       <p:sp>
         <p:nvSpPr>
-          <p:cNvPr id="45" name="PlaceHolder 2"/>
+          <p:cNvPr id="49" name="PlaceHolder 2"/>
           <p:cNvSpPr>
             <a:spLocks noGrp="1"/>
           </p:cNvSpPr>
@@ -1542,7 +1551,7 @@
       </p:sp>
       <p:sp>
         <p:nvSpPr>
-          <p:cNvPr id="46" name="PlaceHolder 3"/>
+          <p:cNvPr id="50" name="PlaceHolder 3"/>
           <p:cNvSpPr>
             <a:spLocks noGrp="1"/>
           </p:cNvSpPr>
@@ -1594,7 +1603,7 @@
       </p:grpSpPr>
       <p:sp>
         <p:nvSpPr>
-          <p:cNvPr id="47" name="PlaceHolder 1"/>
+          <p:cNvPr id="51" name="PlaceHolder 1"/>
           <p:cNvSpPr>
             <a:spLocks noGrp="1"/>
           </p:cNvSpPr>
@@ -1647,7 +1656,7 @@
       </p:grpSpPr>
       <p:sp>
         <p:nvSpPr>
-          <p:cNvPr id="48" name="PlaceHolder 1"/>
+          <p:cNvPr id="52" name="PlaceHolder 1"/>
           <p:cNvSpPr>
             <a:spLocks noGrp="1"/>
           </p:cNvSpPr>
@@ -1700,7 +1709,7 @@
       </p:grpSpPr>
       <p:sp>
         <p:nvSpPr>
-          <p:cNvPr id="49" name="PlaceHolder 1"/>
+          <p:cNvPr id="53" name="PlaceHolder 1"/>
           <p:cNvSpPr>
             <a:spLocks noGrp="1"/>
           </p:cNvSpPr>
@@ -1731,7 +1740,7 @@
       </p:sp>
       <p:sp>
         <p:nvSpPr>
-          <p:cNvPr id="50" name="PlaceHolder 2"/>
+          <p:cNvPr id="54" name="PlaceHolder 2"/>
           <p:cNvSpPr>
             <a:spLocks noGrp="1"/>
           </p:cNvSpPr>
@@ -1761,7 +1770,7 @@
       </p:sp>
       <p:sp>
         <p:nvSpPr>
-          <p:cNvPr id="51" name="PlaceHolder 3"/>
+          <p:cNvPr id="55" name="PlaceHolder 3"/>
           <p:cNvSpPr>
             <a:spLocks noGrp="1"/>
           </p:cNvSpPr>
@@ -1791,7 +1800,7 @@
       </p:sp>
       <p:sp>
         <p:nvSpPr>
-          <p:cNvPr id="52" name="PlaceHolder 4"/>
+          <p:cNvPr id="56" name="PlaceHolder 4"/>
           <p:cNvSpPr>
             <a:spLocks noGrp="1"/>
           </p:cNvSpPr>
@@ -1927,7 +1936,7 @@
       </p:grpSpPr>
       <p:sp>
         <p:nvSpPr>
-          <p:cNvPr id="53" name="PlaceHolder 1"/>
+          <p:cNvPr id="57" name="PlaceHolder 1"/>
           <p:cNvSpPr>
             <a:spLocks noGrp="1"/>
           </p:cNvSpPr>
@@ -1958,7 +1967,7 @@
       </p:sp>
       <p:sp>
         <p:nvSpPr>
-          <p:cNvPr id="54" name="PlaceHolder 2"/>
+          <p:cNvPr id="58" name="PlaceHolder 2"/>
           <p:cNvSpPr>
             <a:spLocks noGrp="1"/>
           </p:cNvSpPr>
@@ -1988,7 +1997,7 @@
       </p:sp>
       <p:sp>
         <p:nvSpPr>
-          <p:cNvPr id="55" name="PlaceHolder 3"/>
+          <p:cNvPr id="59" name="PlaceHolder 3"/>
           <p:cNvSpPr>
             <a:spLocks noGrp="1"/>
           </p:cNvSpPr>
@@ -2018,7 +2027,7 @@
       </p:sp>
       <p:sp>
         <p:nvSpPr>
-          <p:cNvPr id="56" name="PlaceHolder 4"/>
+          <p:cNvPr id="60" name="PlaceHolder 4"/>
           <p:cNvSpPr>
             <a:spLocks noGrp="1"/>
           </p:cNvSpPr>
@@ -2070,7 +2079,7 @@
       </p:grpSpPr>
       <p:sp>
         <p:nvSpPr>
-          <p:cNvPr id="57" name="PlaceHolder 1"/>
+          <p:cNvPr id="61" name="PlaceHolder 1"/>
           <p:cNvSpPr>
             <a:spLocks noGrp="1"/>
           </p:cNvSpPr>
@@ -2101,7 +2110,7 @@
       </p:sp>
       <p:sp>
         <p:nvSpPr>
-          <p:cNvPr id="58" name="PlaceHolder 2"/>
+          <p:cNvPr id="62" name="PlaceHolder 2"/>
           <p:cNvSpPr>
             <a:spLocks noGrp="1"/>
           </p:cNvSpPr>
@@ -2131,7 +2140,7 @@
       </p:sp>
       <p:sp>
         <p:nvSpPr>
-          <p:cNvPr id="59" name="PlaceHolder 3"/>
+          <p:cNvPr id="63" name="PlaceHolder 3"/>
           <p:cNvSpPr>
             <a:spLocks noGrp="1"/>
           </p:cNvSpPr>
@@ -2161,7 +2170,7 @@
       </p:sp>
       <p:sp>
         <p:nvSpPr>
-          <p:cNvPr id="60" name="PlaceHolder 4"/>
+          <p:cNvPr id="64" name="PlaceHolder 4"/>
           <p:cNvSpPr>
             <a:spLocks noGrp="1"/>
           </p:cNvSpPr>
@@ -2213,7 +2222,7 @@
       </p:grpSpPr>
       <p:sp>
         <p:nvSpPr>
-          <p:cNvPr id="61" name="PlaceHolder 1"/>
+          <p:cNvPr id="65" name="PlaceHolder 1"/>
           <p:cNvSpPr>
             <a:spLocks noGrp="1"/>
           </p:cNvSpPr>
@@ -2244,7 +2253,7 @@
       </p:sp>
       <p:sp>
         <p:nvSpPr>
-          <p:cNvPr id="62" name="PlaceHolder 2"/>
+          <p:cNvPr id="66" name="PlaceHolder 2"/>
           <p:cNvSpPr>
             <a:spLocks noGrp="1"/>
           </p:cNvSpPr>
@@ -2274,7 +2283,7 @@
       </p:sp>
       <p:sp>
         <p:nvSpPr>
-          <p:cNvPr id="63" name="PlaceHolder 3"/>
+          <p:cNvPr id="67" name="PlaceHolder 3"/>
           <p:cNvSpPr>
             <a:spLocks noGrp="1"/>
           </p:cNvSpPr>
@@ -2326,7 +2335,7 @@
       </p:grpSpPr>
       <p:sp>
         <p:nvSpPr>
-          <p:cNvPr id="64" name="PlaceHolder 1"/>
+          <p:cNvPr id="68" name="PlaceHolder 1"/>
           <p:cNvSpPr>
             <a:spLocks noGrp="1"/>
           </p:cNvSpPr>
@@ -2357,7 +2366,7 @@
       </p:sp>
       <p:sp>
         <p:nvSpPr>
-          <p:cNvPr id="65" name="PlaceHolder 2"/>
+          <p:cNvPr id="69" name="PlaceHolder 2"/>
           <p:cNvSpPr>
             <a:spLocks noGrp="1"/>
           </p:cNvSpPr>
@@ -2387,7 +2396,7 @@
       </p:sp>
       <p:sp>
         <p:nvSpPr>
-          <p:cNvPr id="66" name="PlaceHolder 3"/>
+          <p:cNvPr id="70" name="PlaceHolder 3"/>
           <p:cNvSpPr>
             <a:spLocks noGrp="1"/>
           </p:cNvSpPr>
@@ -2417,7 +2426,7 @@
       </p:sp>
       <p:sp>
         <p:nvSpPr>
-          <p:cNvPr id="67" name="PlaceHolder 4"/>
+          <p:cNvPr id="71" name="PlaceHolder 4"/>
           <p:cNvSpPr>
             <a:spLocks noGrp="1"/>
           </p:cNvSpPr>
@@ -2447,7 +2456,7 @@
       </p:sp>
       <p:sp>
         <p:nvSpPr>
-          <p:cNvPr id="68" name="PlaceHolder 5"/>
+          <p:cNvPr id="72" name="PlaceHolder 5"/>
           <p:cNvSpPr>
             <a:spLocks noGrp="1"/>
           </p:cNvSpPr>
@@ -2499,7 +2508,7 @@
       </p:grpSpPr>
       <p:sp>
         <p:nvSpPr>
-          <p:cNvPr id="69" name="PlaceHolder 1"/>
+          <p:cNvPr id="73" name="PlaceHolder 1"/>
           <p:cNvSpPr>
             <a:spLocks noGrp="1"/>
           </p:cNvSpPr>
@@ -2530,7 +2539,7 @@
       </p:sp>
       <p:sp>
         <p:nvSpPr>
-          <p:cNvPr id="70" name="PlaceHolder 2"/>
+          <p:cNvPr id="74" name="PlaceHolder 2"/>
           <p:cNvSpPr>
             <a:spLocks noGrp="1"/>
           </p:cNvSpPr>
@@ -2560,7 +2569,7 @@
       </p:sp>
       <p:sp>
         <p:nvSpPr>
-          <p:cNvPr id="71" name="PlaceHolder 3"/>
+          <p:cNvPr id="75" name="PlaceHolder 3"/>
           <p:cNvSpPr>
             <a:spLocks noGrp="1"/>
           </p:cNvSpPr>
@@ -2590,7 +2599,7 @@
       </p:sp>
       <p:sp>
         <p:nvSpPr>
-          <p:cNvPr id="72" name="PlaceHolder 4"/>
+          <p:cNvPr id="76" name="PlaceHolder 4"/>
           <p:cNvSpPr>
             <a:spLocks noGrp="1"/>
           </p:cNvSpPr>
@@ -2620,7 +2629,7 @@
       </p:sp>
       <p:sp>
         <p:nvSpPr>
-          <p:cNvPr id="73" name="PlaceHolder 5"/>
+          <p:cNvPr id="77" name="PlaceHolder 5"/>
           <p:cNvSpPr>
             <a:spLocks noGrp="1"/>
           </p:cNvSpPr>
@@ -2650,7 +2659,7 @@
       </p:sp>
       <p:sp>
         <p:nvSpPr>
-          <p:cNvPr id="74" name="PlaceHolder 6"/>
+          <p:cNvPr id="78" name="PlaceHolder 6"/>
           <p:cNvSpPr>
             <a:spLocks noGrp="1"/>
           </p:cNvSpPr>
@@ -2680,7 +2689,7 @@
       </p:sp>
       <p:sp>
         <p:nvSpPr>
-          <p:cNvPr id="75" name="PlaceHolder 7"/>
+          <p:cNvPr id="79" name="PlaceHolder 7"/>
           <p:cNvSpPr>
             <a:spLocks noGrp="1"/>
           </p:cNvSpPr>
@@ -3480,8 +3489,8 @@
         </p:nvSpPr>
         <p:spPr>
           <a:xfrm>
-            <a:off x="838080" y="365040"/>
-            <a:ext cx="10514880" cy="1324800"/>
+            <a:off x="609480" y="273600"/>
+            <a:ext cx="10972080" cy="1144440"/>
           </a:xfrm>
           <a:prstGeom prst="rect">
             <a:avLst/>
@@ -3529,7 +3538,7 @@
         <p:spPr>
           <a:xfrm>
             <a:off x="609480" y="1604520"/>
-            <a:ext cx="10972440" cy="3977280"/>
+            <a:ext cx="10972080" cy="3976920"/>
           </a:xfrm>
           <a:prstGeom prst="rect">
             <a:avLst/>
@@ -3552,12 +3561,12 @@
               <a:buChar char=""/>
             </a:pPr>
             <a:r>
-              <a:rPr b="0" lang="en-US" sz="3200" spc="-1" strike="noStrike">
+              <a:rPr b="0" lang="en-US" sz="1800" spc="-1" strike="noStrike">
                 <a:latin typeface="Arial"/>
               </a:rPr>
               <a:t>Click to edit the outline text format</a:t>
             </a:r>
-            <a:endParaRPr b="0" lang="en-US" sz="3200" spc="-1" strike="noStrike">
+            <a:endParaRPr b="0" lang="en-US" sz="1800" spc="-1" strike="noStrike">
               <a:latin typeface="Arial"/>
             </a:endParaRPr>
           </a:p>
@@ -3574,12 +3583,12 @@
               <a:buChar char=""/>
             </a:pPr>
             <a:r>
-              <a:rPr b="0" lang="en-US" sz="2800" spc="-1" strike="noStrike">
+              <a:rPr b="0" lang="en-US" sz="1800" spc="-1" strike="noStrike">
                 <a:latin typeface="Arial"/>
               </a:rPr>
               <a:t>Second Outline Level</a:t>
             </a:r>
-            <a:endParaRPr b="0" lang="en-US" sz="2800" spc="-1" strike="noStrike">
+            <a:endParaRPr b="0" lang="en-US" sz="1800" spc="-1" strike="noStrike">
               <a:latin typeface="Arial"/>
             </a:endParaRPr>
           </a:p>
@@ -3596,12 +3605,12 @@
               <a:buChar char=""/>
             </a:pPr>
             <a:r>
-              <a:rPr b="0" lang="en-US" sz="2400" spc="-1" strike="noStrike">
+              <a:rPr b="0" lang="en-US" sz="1800" spc="-1" strike="noStrike">
                 <a:latin typeface="Arial"/>
               </a:rPr>
               <a:t>Third Outline Level</a:t>
             </a:r>
-            <a:endParaRPr b="0" lang="en-US" sz="2400" spc="-1" strike="noStrike">
+            <a:endParaRPr b="0" lang="en-US" sz="1800" spc="-1" strike="noStrike">
               <a:latin typeface="Arial"/>
             </a:endParaRPr>
           </a:p>
@@ -3618,12 +3627,12 @@
               <a:buChar char=""/>
             </a:pPr>
             <a:r>
-              <a:rPr b="0" lang="en-US" sz="2000" spc="-1" strike="noStrike">
+              <a:rPr b="0" lang="en-US" sz="1800" spc="-1" strike="noStrike">
                 <a:latin typeface="Arial"/>
               </a:rPr>
               <a:t>Fourth Outline Level</a:t>
             </a:r>
-            <a:endParaRPr b="0" lang="en-US" sz="2000" spc="-1" strike="noStrike">
+            <a:endParaRPr b="0" lang="en-US" sz="1800" spc="-1" strike="noStrike">
               <a:latin typeface="Arial"/>
             </a:endParaRPr>
           </a:p>
@@ -3640,12 +3649,12 @@
               <a:buChar char=""/>
             </a:pPr>
             <a:r>
-              <a:rPr b="0" lang="en-US" sz="2000" spc="-1" strike="noStrike">
+              <a:rPr b="0" lang="en-US" sz="1800" spc="-1" strike="noStrike">
                 <a:latin typeface="Arial"/>
               </a:rPr>
               <a:t>Fifth Outline Level</a:t>
             </a:r>
-            <a:endParaRPr b="0" lang="en-US" sz="2000" spc="-1" strike="noStrike">
+            <a:endParaRPr b="0" lang="en-US" sz="1800" spc="-1" strike="noStrike">
               <a:latin typeface="Arial"/>
             </a:endParaRPr>
           </a:p>
@@ -3662,12 +3671,12 @@
               <a:buChar char=""/>
             </a:pPr>
             <a:r>
-              <a:rPr b="0" lang="en-US" sz="2000" spc="-1" strike="noStrike">
+              <a:rPr b="0" lang="en-US" sz="1800" spc="-1" strike="noStrike">
                 <a:latin typeface="Arial"/>
               </a:rPr>
               <a:t>Sixth Outline Level</a:t>
             </a:r>
-            <a:endParaRPr b="0" lang="en-US" sz="2000" spc="-1" strike="noStrike">
+            <a:endParaRPr b="0" lang="en-US" sz="1800" spc="-1" strike="noStrike">
               <a:latin typeface="Arial"/>
             </a:endParaRPr>
           </a:p>
@@ -3684,12 +3693,12 @@
               <a:buChar char=""/>
             </a:pPr>
             <a:r>
-              <a:rPr b="0" lang="en-US" sz="2000" spc="-1" strike="noStrike">
+              <a:rPr b="0" lang="en-US" sz="1800" spc="-1" strike="noStrike">
                 <a:latin typeface="Arial"/>
               </a:rPr>
               <a:t>Seventh Outline Level</a:t>
             </a:r>
-            <a:endParaRPr b="0" lang="en-US" sz="2000" spc="-1" strike="noStrike">
+            <a:endParaRPr b="0" lang="en-US" sz="1800" spc="-1" strike="noStrike">
               <a:latin typeface="Arial"/>
             </a:endParaRPr>
           </a:p>
@@ -4027,6 +4036,240 @@
           </a:p>
         </p:txBody>
       </p:sp>
+      <p:sp>
+        <p:nvSpPr>
+          <p:cNvPr id="40" name="CustomShape 3"/>
+          <p:cNvSpPr/>
+          <p:nvPr/>
+        </p:nvSpPr>
+        <p:spPr>
+          <a:xfrm>
+            <a:off x="7218720" y="6472800"/>
+            <a:ext cx="2033280" cy="363960"/>
+          </a:xfrm>
+          <a:prstGeom prst="rect">
+            <a:avLst/>
+          </a:prstGeom>
+          <a:noFill/>
+          <a:ln w="0">
+            <a:noFill/>
+          </a:ln>
+        </p:spPr>
+        <p:style>
+          <a:lnRef idx="0"/>
+          <a:fillRef idx="0"/>
+          <a:effectRef idx="0"/>
+          <a:fontRef idx="minor"/>
+        </p:style>
+        <p:txBody>
+          <a:bodyPr lIns="90000" rIns="90000" tIns="45000" bIns="45000" anchor="ctr">
+            <a:noAutofit/>
+          </a:bodyPr>
+          <a:p>
+            <a:pPr>
+              <a:lnSpc>
+                <a:spcPct val="100000"/>
+              </a:lnSpc>
+            </a:pPr>
+            <a:r>
+              <a:rPr b="0" lang="en-US" sz="1200" spc="-1" strike="noStrike">
+                <a:solidFill>
+                  <a:srgbClr val="8b8b8b"/>
+                </a:solidFill>
+                <a:latin typeface="Calibri"/>
+                <a:ea typeface="DejaVu Sans"/>
+              </a:rPr>
+              <a:t>David von </a:t>
+            </a:r>
+            <a:r>
+              <a:rPr b="0" lang="en-US" sz="1200" spc="-1" strike="noStrike">
+                <a:solidFill>
+                  <a:srgbClr val="8b8b8b"/>
+                </a:solidFill>
+                <a:latin typeface="Calibri"/>
+                <a:ea typeface="DejaVu Sans"/>
+              </a:rPr>
+              <a:t>Oheimb, </a:t>
+            </a:r>
+            <a:r>
+              <a:rPr b="0" lang="en-US" sz="1200" spc="-1" strike="noStrike">
+                <a:solidFill>
+                  <a:srgbClr val="8b8b8b"/>
+                </a:solidFill>
+                <a:latin typeface="Calibri"/>
+                <a:ea typeface="DejaVu Sans"/>
+              </a:rPr>
+              <a:t>Siemens</a:t>
+            </a:r>
+            <a:endParaRPr b="0" lang="en-US" sz="1200" spc="-1" strike="noStrike">
+              <a:latin typeface="Arial"/>
+            </a:endParaRPr>
+          </a:p>
+        </p:txBody>
+      </p:sp>
+      <p:sp>
+        <p:nvSpPr>
+          <p:cNvPr id="41" name="CustomShape 4"/>
+          <p:cNvSpPr/>
+          <p:nvPr/>
+        </p:nvSpPr>
+        <p:spPr>
+          <a:xfrm>
+            <a:off x="4032000" y="6472800"/>
+            <a:ext cx="1296000" cy="363960"/>
+          </a:xfrm>
+          <a:prstGeom prst="rect">
+            <a:avLst/>
+          </a:prstGeom>
+          <a:noFill/>
+          <a:ln w="0">
+            <a:noFill/>
+          </a:ln>
+        </p:spPr>
+        <p:style>
+          <a:lnRef idx="0"/>
+          <a:fillRef idx="0"/>
+          <a:effectRef idx="0"/>
+          <a:fontRef idx="minor"/>
+        </p:style>
+        <p:txBody>
+          <a:bodyPr lIns="90000" rIns="90000" tIns="45000" bIns="45000" anchor="ctr">
+            <a:noAutofit/>
+          </a:bodyPr>
+          <a:p>
+            <a:pPr>
+              <a:lnSpc>
+                <a:spcPct val="100000"/>
+              </a:lnSpc>
+            </a:pPr>
+            <a:r>
+              <a:rPr b="0" lang="en-US" sz="1200" spc="-1" strike="noStrike">
+                <a:solidFill>
+                  <a:srgbClr val="8b8b8b"/>
+                </a:solidFill>
+                <a:latin typeface="Calibri"/>
+                <a:ea typeface="DejaVu Sans"/>
+              </a:rPr>
+              <a:t>2022-March-25</a:t>
+            </a:r>
+            <a:endParaRPr b="0" lang="en-US" sz="1200" spc="-1" strike="noStrike">
+              <a:latin typeface="Arial"/>
+            </a:endParaRPr>
+          </a:p>
+        </p:txBody>
+      </p:sp>
+      <p:sp>
+        <p:nvSpPr>
+          <p:cNvPr id="42" name="CustomShape 5"/>
+          <p:cNvSpPr/>
+          <p:nvPr/>
+        </p:nvSpPr>
+        <p:spPr>
+          <a:xfrm>
+            <a:off x="846720" y="6508800"/>
+            <a:ext cx="1266120" cy="363960"/>
+          </a:xfrm>
+          <a:prstGeom prst="rect">
+            <a:avLst/>
+          </a:prstGeom>
+          <a:noFill/>
+          <a:ln w="0">
+            <a:noFill/>
+          </a:ln>
+        </p:spPr>
+        <p:style>
+          <a:lnRef idx="0"/>
+          <a:fillRef idx="0"/>
+          <a:effectRef idx="0"/>
+          <a:fontRef idx="minor"/>
+        </p:style>
+        <p:txBody>
+          <a:bodyPr lIns="90000" rIns="90000" tIns="45000" bIns="45000" anchor="ctr">
+            <a:noAutofit/>
+          </a:bodyPr>
+          <a:p>
+            <a:pPr>
+              <a:lnSpc>
+                <a:spcPct val="100000"/>
+              </a:lnSpc>
+            </a:pPr>
+            <a:r>
+              <a:rPr b="0" lang="en-US" sz="1200" spc="-1" strike="noStrike">
+                <a:solidFill>
+                  <a:srgbClr val="8b8b8b"/>
+                </a:solidFill>
+                <a:latin typeface="Calibri"/>
+                <a:ea typeface="DejaVu Sans"/>
+              </a:rPr>
+              <a:t>BRSKI-AE status</a:t>
+            </a:r>
+            <a:r>
+              <a:rPr b="0" lang="en-US" sz="1200" spc="-1" strike="noStrike">
+                <a:solidFill>
+                  <a:srgbClr val="8b8b8b"/>
+                </a:solidFill>
+                <a:latin typeface="Calibri"/>
+                <a:ea typeface="DejaVu Sans"/>
+              </a:rPr>
+              <a:t>	</a:t>
+            </a:r>
+            <a:endParaRPr b="0" lang="en-US" sz="1200" spc="-1" strike="noStrike">
+              <a:latin typeface="Arial"/>
+            </a:endParaRPr>
+          </a:p>
+        </p:txBody>
+      </p:sp>
+      <p:sp>
+        <p:nvSpPr>
+          <p:cNvPr id="43" name="CustomShape 6"/>
+          <p:cNvSpPr/>
+          <p:nvPr/>
+        </p:nvSpPr>
+        <p:spPr>
+          <a:xfrm>
+            <a:off x="11016000" y="6472800"/>
+            <a:ext cx="900000" cy="363960"/>
+          </a:xfrm>
+          <a:prstGeom prst="rect">
+            <a:avLst/>
+          </a:prstGeom>
+          <a:noFill/>
+          <a:ln w="0">
+            <a:noFill/>
+          </a:ln>
+        </p:spPr>
+        <p:style>
+          <a:lnRef idx="0"/>
+          <a:fillRef idx="0"/>
+          <a:effectRef idx="0"/>
+          <a:fontRef idx="minor"/>
+        </p:style>
+        <p:txBody>
+          <a:bodyPr lIns="90000" rIns="90000" tIns="45000" bIns="45000" anchor="ctr">
+            <a:noAutofit/>
+          </a:bodyPr>
+          <a:p>
+            <a:pPr>
+              <a:lnSpc>
+                <a:spcPct val="100000"/>
+              </a:lnSpc>
+            </a:pPr>
+            <a:fld id="{7A76127B-5155-411F-A706-2C4064F24B3D}" type="slidenum">
+              <a:rPr b="0" lang="en-US" sz="1200" spc="-1" strike="noStrike">
+                <a:solidFill>
+                  <a:srgbClr val="8b8b8b"/>
+                </a:solidFill>
+                <a:latin typeface="Calibri"/>
+                <a:ea typeface="DejaVu Sans"/>
+              </a:rPr>
+              <a:t>&lt;number&gt;</a:t>
+            </a:fld>
+            <a:endParaRPr b="0" lang="en-US" sz="1200" spc="-1" strike="noStrike">
+              <a:latin typeface="Arial"/>
+            </a:endParaRPr>
+          </a:p>
+        </p:txBody>
+      </p:sp>
     </p:spTree>
   </p:cSld>
   <p:clrMap bg1="lt1" bg2="lt2" tx1="dk1" tx2="dk2" accent1="accent1" accent2="accent2" accent3="accent3" accent4="accent4" accent5="accent5" accent6="accent6" hlink="hlink" folHlink="folHlink"/>
@@ -4066,14 +4309,14 @@
       </p:grpSpPr>
       <p:sp>
         <p:nvSpPr>
-          <p:cNvPr id="82" name="CustomShape 1"/>
+          <p:cNvPr id="86" name="CustomShape 1"/>
           <p:cNvSpPr/>
           <p:nvPr/>
         </p:nvSpPr>
         <p:spPr>
           <a:xfrm>
             <a:off x="219960" y="770760"/>
-            <a:ext cx="11683440" cy="1588320"/>
+            <a:ext cx="11683080" cy="1587960"/>
           </a:xfrm>
           <a:prstGeom prst="rect">
             <a:avLst/>
@@ -4105,6 +4348,7 @@
                   <a:srgbClr val="000000"/>
                 </a:solidFill>
                 <a:latin typeface="Calibri Light"/>
+                <a:ea typeface="DejaVu Sans"/>
               </a:rPr>
               <a:t>Update on BRSKI-AE: </a:t>
             </a:r>
@@ -4115,6 +4359,7 @@
                   <a:srgbClr val="000000"/>
                 </a:solidFill>
                 <a:latin typeface="Calibri Light"/>
+                <a:ea typeface="DejaVu Sans"/>
               </a:rPr>
               <a:t>Alternative Enrollment Protocols in BRSKI</a:t>
             </a:r>
@@ -4126,14 +4371,14 @@
       </p:sp>
       <p:sp>
         <p:nvSpPr>
-          <p:cNvPr id="83" name="CustomShape 2"/>
+          <p:cNvPr id="87" name="CustomShape 2"/>
           <p:cNvSpPr/>
           <p:nvPr/>
         </p:nvSpPr>
         <p:spPr>
           <a:xfrm>
             <a:off x="432720" y="2359800"/>
-            <a:ext cx="11470680" cy="4158360"/>
+            <a:ext cx="11470320" cy="4158000"/>
           </a:xfrm>
           <a:prstGeom prst="rect">
             <a:avLst/>
@@ -4182,21 +4427,24 @@
               </a:tabLst>
             </a:pPr>
             <a:r>
+              <a:rPr b="0" lang="en-US" sz="2400" spc="-1" strike="noStrike" u="sng">
+                <a:solidFill>
+                  <a:srgbClr val="0563c1"/>
+                </a:solidFill>
+                <a:uFillTx/>
+                <a:latin typeface="Calibri"/>
+                <a:ea typeface="DejaVu Sans"/>
+                <a:hlinkClick r:id="rId1"/>
+              </a:rPr>
+              <a:t>draft-ietf-anima-brski-async-enroll</a:t>
+            </a:r>
+            <a:r>
               <a:rPr b="0" lang="en-US" sz="2400" spc="-1" strike="noStrike">
                 <a:solidFill>
                   <a:srgbClr val="000000"/>
                 </a:solidFill>
                 <a:latin typeface="Calibri"/>
-                <a:hlinkClick r:id="rId1"/>
-              </a:rPr>
-              <a:t>draft-ietf-anima-brski-async-enroll</a:t>
-            </a:r>
-            <a:r>
-              <a:rPr b="0" lang="en-US" sz="2400" spc="-1" strike="noStrike">
-                <a:solidFill>
-                  <a:srgbClr val="000000"/>
-                </a:solidFill>
-                <a:latin typeface="Calibri"/>
+                <a:ea typeface="DejaVu Sans"/>
               </a:rPr>
               <a:t>-05</a:t>
             </a:r>
@@ -4238,15 +4486,18 @@
                   <a:srgbClr val="000000"/>
                 </a:solidFill>
                 <a:latin typeface="Calibri"/>
+                <a:ea typeface="DejaVu Sans"/>
               </a:rPr>
               <a:t>Repo so far: </a:t>
             </a:r>
             <a:r>
-              <a:rPr b="0" lang="en-US" sz="2400" spc="-1" strike="noStrike">
-                <a:solidFill>
-                  <a:srgbClr val="808080"/>
-                </a:solidFill>
+              <a:rPr b="0" lang="en-US" sz="2400" spc="-1" strike="noStrike" u="sng">
+                <a:solidFill>
+                  <a:srgbClr val="0563c1"/>
+                </a:solidFill>
+                <a:uFillTx/>
                 <a:latin typeface="FreeMono"/>
+                <a:ea typeface="DejaVu Sans"/>
                 <a:hlinkClick r:id="rId2"/>
               </a:rPr>
               <a:t>https://github.com/anima-wg/anima-brski-async-enroll</a:t>
@@ -4273,15 +4524,18 @@
                   <a:srgbClr val="000000"/>
                 </a:solidFill>
                 <a:latin typeface="Calibri"/>
+                <a:ea typeface="DejaVu Sans"/>
               </a:rPr>
               <a:t>Proposed new repo URL: </a:t>
             </a:r>
             <a:r>
-              <a:rPr b="1" lang="en-US" sz="2400" spc="-1" strike="noStrike">
-                <a:solidFill>
-                  <a:srgbClr val="000000"/>
-                </a:solidFill>
+              <a:rPr b="1" lang="en-US" sz="2400" spc="-1" strike="noStrike" u="sng">
+                <a:solidFill>
+                  <a:srgbClr val="0563c1"/>
+                </a:solidFill>
+                <a:uFillTx/>
                 <a:latin typeface="FreeMono"/>
+                <a:ea typeface="DejaVu Sans"/>
                 <a:hlinkClick r:id="rId3"/>
               </a:rPr>
               <a:t>https://github.com/anima-wg/anima-brski-ae</a:t>
@@ -4324,6 +4578,7 @@
                   <a:srgbClr val="000000"/>
                 </a:solidFill>
                 <a:latin typeface="Calibri"/>
+                <a:ea typeface="DejaVu Sans"/>
               </a:rPr>
               <a:t>David von Oheimb, Steffen Fries, Hendrik Brockhaus, Eliot Lear</a:t>
             </a:r>
@@ -4349,6 +4604,7 @@
                   <a:srgbClr val="000000"/>
                 </a:solidFill>
                 <a:latin typeface="Calibri"/>
+                <a:ea typeface="DejaVu Sans"/>
               </a:rPr>
               <a:t>David von Oheimb (Ed.)</a:t>
             </a:r>
@@ -4390,6 +4646,7 @@
                   <a:srgbClr val="000000"/>
                 </a:solidFill>
                 <a:latin typeface="Calibri"/>
+                <a:ea typeface="DejaVu Sans"/>
               </a:rPr>
               <a:t>IETF 113 – ANIMA Working Group</a:t>
             </a:r>
@@ -4447,14 +4704,14 @@
       </p:grpSpPr>
       <p:sp>
         <p:nvSpPr>
-          <p:cNvPr id="84" name="CustomShape 1"/>
+          <p:cNvPr id="88" name="CustomShape 1"/>
           <p:cNvSpPr/>
           <p:nvPr/>
         </p:nvSpPr>
         <p:spPr>
           <a:xfrm>
-            <a:off x="9000000" y="1826640"/>
-            <a:ext cx="1659960" cy="4833000"/>
+            <a:off x="9000000" y="1502640"/>
+            <a:ext cx="1659600" cy="4832640"/>
           </a:xfrm>
           <a:prstGeom prst="rect">
             <a:avLst/>
@@ -4477,14 +4734,14 @@
       </p:sp>
       <p:sp>
         <p:nvSpPr>
-          <p:cNvPr id="85" name="CustomShape 2"/>
+          <p:cNvPr id="89" name="CustomShape 2"/>
           <p:cNvSpPr/>
           <p:nvPr/>
         </p:nvSpPr>
         <p:spPr>
           <a:xfrm>
-            <a:off x="2023560" y="1835640"/>
-            <a:ext cx="2717280" cy="4824000"/>
+            <a:off x="2023560" y="1511640"/>
+            <a:ext cx="2716920" cy="4823640"/>
           </a:xfrm>
           <a:prstGeom prst="rect">
             <a:avLst/>
@@ -4507,14 +4764,14 @@
       </p:sp>
       <p:sp>
         <p:nvSpPr>
-          <p:cNvPr id="86" name="CustomShape 3"/>
+          <p:cNvPr id="90" name="CustomShape 3"/>
           <p:cNvSpPr/>
           <p:nvPr/>
         </p:nvSpPr>
         <p:spPr>
           <a:xfrm>
-            <a:off x="1997640" y="2601000"/>
-            <a:ext cx="2777400" cy="1326960"/>
+            <a:off x="1997640" y="2277000"/>
+            <a:ext cx="2777040" cy="1326600"/>
           </a:xfrm>
           <a:prstGeom prst="rect">
             <a:avLst/>
@@ -4543,14 +4800,14 @@
       </p:sp>
       <p:sp>
         <p:nvSpPr>
-          <p:cNvPr id="87" name="CustomShape 4"/>
+          <p:cNvPr id="91" name="CustomShape 4"/>
           <p:cNvSpPr/>
           <p:nvPr/>
         </p:nvSpPr>
         <p:spPr>
           <a:xfrm>
-            <a:off x="2369880" y="2429280"/>
-            <a:ext cx="2101680" cy="328680"/>
+            <a:off x="2369880" y="2105280"/>
+            <a:ext cx="2101320" cy="328320"/>
           </a:xfrm>
           <a:prstGeom prst="rect">
             <a:avLst/>
@@ -4598,14 +4855,14 @@
       </p:sp>
       <p:sp>
         <p:nvSpPr>
-          <p:cNvPr id="88" name="CustomShape 5"/>
+          <p:cNvPr id="92" name="CustomShape 5"/>
           <p:cNvSpPr/>
           <p:nvPr/>
         </p:nvSpPr>
         <p:spPr>
           <a:xfrm>
-            <a:off x="2369880" y="3859560"/>
-            <a:ext cx="2101680" cy="181800"/>
+            <a:off x="2369880" y="3535560"/>
+            <a:ext cx="2101320" cy="181440"/>
           </a:xfrm>
           <a:prstGeom prst="rect">
             <a:avLst/>
@@ -4653,14 +4910,14 @@
       </p:sp>
       <p:sp>
         <p:nvSpPr>
-          <p:cNvPr id="89" name="CustomShape 6"/>
+          <p:cNvPr id="93" name="CustomShape 6"/>
           <p:cNvSpPr/>
           <p:nvPr/>
         </p:nvSpPr>
         <p:spPr>
           <a:xfrm>
-            <a:off x="4790520" y="1826640"/>
-            <a:ext cx="4105440" cy="4833000"/>
+            <a:off x="4790520" y="1502640"/>
+            <a:ext cx="4105080" cy="4832640"/>
           </a:xfrm>
           <a:prstGeom prst="rect">
             <a:avLst/>
@@ -4683,14 +4940,14 @@
       </p:sp>
       <p:sp>
         <p:nvSpPr>
-          <p:cNvPr id="90" name="CustomShape 7"/>
+          <p:cNvPr id="94" name="CustomShape 7"/>
           <p:cNvSpPr/>
           <p:nvPr/>
         </p:nvSpPr>
         <p:spPr>
           <a:xfrm>
-            <a:off x="2232000" y="3024000"/>
-            <a:ext cx="2529360" cy="360"/>
+            <a:off x="2232000" y="2700000"/>
+            <a:ext cx="2529000" cy="360"/>
           </a:xfrm>
           <a:custGeom>
             <a:avLst/>
@@ -4726,14 +4983,14 @@
       </p:sp>
       <p:sp>
         <p:nvSpPr>
-          <p:cNvPr id="91" name="CustomShape 8"/>
+          <p:cNvPr id="95" name="CustomShape 8"/>
           <p:cNvSpPr/>
           <p:nvPr/>
         </p:nvSpPr>
         <p:spPr>
           <a:xfrm>
-            <a:off x="2198520" y="2838240"/>
-            <a:ext cx="2562840" cy="211680"/>
+            <a:off x="2198520" y="2514240"/>
+            <a:ext cx="2562480" cy="211320"/>
           </a:xfrm>
           <a:prstGeom prst="rect">
             <a:avLst/>
@@ -4777,14 +5034,14 @@
       </p:sp>
       <p:sp>
         <p:nvSpPr>
-          <p:cNvPr id="92" name="CustomShape 9"/>
+          <p:cNvPr id="96" name="CustomShape 9"/>
           <p:cNvSpPr/>
           <p:nvPr/>
         </p:nvSpPr>
         <p:spPr>
           <a:xfrm flipH="1">
-            <a:off x="2262600" y="3822840"/>
-            <a:ext cx="2498040" cy="360"/>
+            <a:off x="2262600" y="3498840"/>
+            <a:ext cx="2497680" cy="360"/>
           </a:xfrm>
           <a:custGeom>
             <a:avLst/>
@@ -4820,14 +5077,14 @@
       </p:sp>
       <p:sp>
         <p:nvSpPr>
-          <p:cNvPr id="93" name="CustomShape 10"/>
+          <p:cNvPr id="97" name="CustomShape 10"/>
           <p:cNvSpPr/>
           <p:nvPr/>
         </p:nvSpPr>
         <p:spPr>
           <a:xfrm>
-            <a:off x="5352120" y="2267640"/>
-            <a:ext cx="1821600" cy="577080"/>
+            <a:off x="5352120" y="1943640"/>
+            <a:ext cx="1821240" cy="576720"/>
           </a:xfrm>
           <a:prstGeom prst="rect">
             <a:avLst/>
@@ -4848,7 +5105,7 @@
             <a:spAutoFit/>
           </a:bodyPr>
           <a:p>
-            <a:pPr marL="84960" indent="-84240">
+            <a:pPr marL="84960" indent="-83880">
               <a:lnSpc>
                 <a:spcPct val="100000"/>
               </a:lnSpc>
@@ -4873,7 +5130,7 @@
             </a:endParaRPr>
           </a:p>
           <a:p>
-            <a:pPr marL="84960" indent="-84240">
+            <a:pPr marL="84960" indent="-83880">
               <a:lnSpc>
                 <a:spcPct val="100000"/>
               </a:lnSpc>
@@ -4901,14 +5158,14 @@
       </p:sp>
       <p:sp>
         <p:nvSpPr>
-          <p:cNvPr id="94" name="CustomShape 11"/>
+          <p:cNvPr id="98" name="CustomShape 11"/>
           <p:cNvSpPr/>
           <p:nvPr/>
         </p:nvSpPr>
         <p:spPr>
           <a:xfrm flipV="1">
-            <a:off x="5580360" y="3177360"/>
-            <a:ext cx="5084280" cy="7200"/>
+            <a:off x="5580360" y="2852280"/>
+            <a:ext cx="5083920" cy="6840"/>
           </a:xfrm>
           <a:custGeom>
             <a:avLst/>
@@ -4944,14 +5201,14 @@
       </p:sp>
       <p:sp>
         <p:nvSpPr>
-          <p:cNvPr id="95" name="CustomShape 12"/>
+          <p:cNvPr id="99" name="CustomShape 12"/>
           <p:cNvSpPr/>
           <p:nvPr/>
         </p:nvSpPr>
         <p:spPr>
           <a:xfrm>
-            <a:off x="6446880" y="3008880"/>
-            <a:ext cx="3071160" cy="211680"/>
+            <a:off x="6446880" y="2684880"/>
+            <a:ext cx="3070800" cy="211320"/>
           </a:xfrm>
           <a:prstGeom prst="rect">
             <a:avLst/>
@@ -4995,14 +5252,14 @@
       </p:sp>
       <p:sp>
         <p:nvSpPr>
-          <p:cNvPr id="96" name="CustomShape 13"/>
+          <p:cNvPr id="100" name="CustomShape 13"/>
           <p:cNvSpPr/>
           <p:nvPr/>
         </p:nvSpPr>
         <p:spPr>
           <a:xfrm rot="16200000">
-            <a:off x="10170360" y="2590920"/>
-            <a:ext cx="1798200" cy="698760"/>
+            <a:off x="10170360" y="2267280"/>
+            <a:ext cx="1797840" cy="698400"/>
           </a:xfrm>
           <a:prstGeom prst="rect">
             <a:avLst/>
@@ -5023,7 +5280,7 @@
             <a:spAutoFit/>
           </a:bodyPr>
           <a:p>
-            <a:pPr marL="84960" indent="-84240">
+            <a:pPr marL="84960" indent="-83880">
               <a:lnSpc>
                 <a:spcPct val="100000"/>
               </a:lnSpc>
@@ -5048,7 +5305,7 @@
             </a:endParaRPr>
           </a:p>
           <a:p>
-            <a:pPr marL="84960" indent="-84240">
+            <a:pPr marL="84960" indent="-83880">
               <a:lnSpc>
                 <a:spcPct val="100000"/>
               </a:lnSpc>
@@ -5073,7 +5330,7 @@
             </a:endParaRPr>
           </a:p>
           <a:p>
-            <a:pPr marL="84960" indent="-84240">
+            <a:pPr marL="84960" indent="-83880">
               <a:lnSpc>
                 <a:spcPct val="100000"/>
               </a:lnSpc>
@@ -5101,14 +5358,14 @@
       </p:sp>
       <p:sp>
         <p:nvSpPr>
-          <p:cNvPr id="97" name="CustomShape 14"/>
+          <p:cNvPr id="101" name="CustomShape 14"/>
           <p:cNvSpPr/>
           <p:nvPr/>
         </p:nvSpPr>
         <p:spPr>
           <a:xfrm flipH="1" flipV="1">
-            <a:off x="4794480" y="3724560"/>
-            <a:ext cx="5844960" cy="360"/>
+            <a:off x="4793760" y="3399840"/>
+            <a:ext cx="5844600" cy="360"/>
           </a:xfrm>
           <a:custGeom>
             <a:avLst/>
@@ -5144,14 +5401,14 @@
       </p:sp>
       <p:sp>
         <p:nvSpPr>
-          <p:cNvPr id="98" name="CustomShape 15"/>
+          <p:cNvPr id="102" name="CustomShape 15"/>
           <p:cNvSpPr/>
           <p:nvPr/>
         </p:nvSpPr>
         <p:spPr>
           <a:xfrm>
-            <a:off x="6646320" y="3529080"/>
-            <a:ext cx="2131560" cy="211680"/>
+            <a:off x="6646320" y="3205080"/>
+            <a:ext cx="2131200" cy="211320"/>
           </a:xfrm>
           <a:prstGeom prst="rect">
             <a:avLst/>
@@ -5195,14 +5452,14 @@
       </p:sp>
       <p:sp>
         <p:nvSpPr>
-          <p:cNvPr id="99" name="CustomShape 16"/>
+          <p:cNvPr id="103" name="CustomShape 16"/>
           <p:cNvSpPr/>
           <p:nvPr/>
         </p:nvSpPr>
         <p:spPr>
           <a:xfrm>
-            <a:off x="2157840" y="3646080"/>
-            <a:ext cx="2516760" cy="211680"/>
+            <a:off x="2157840" y="3322080"/>
+            <a:ext cx="2516400" cy="211320"/>
           </a:xfrm>
           <a:prstGeom prst="rect">
             <a:avLst/>
@@ -5246,14 +5503,14 @@
       </p:sp>
       <p:sp>
         <p:nvSpPr>
-          <p:cNvPr id="100" name="CustomShape 17"/>
+          <p:cNvPr id="104" name="CustomShape 17"/>
           <p:cNvSpPr/>
           <p:nvPr/>
         </p:nvSpPr>
         <p:spPr>
           <a:xfrm>
-            <a:off x="1449360" y="1585800"/>
-            <a:ext cx="913320" cy="532440"/>
+            <a:off x="1449360" y="1261800"/>
+            <a:ext cx="912960" cy="532080"/>
           </a:xfrm>
           <a:prstGeom prst="rect">
             <a:avLst/>
@@ -5302,14 +5559,14 @@
       </p:sp>
       <p:sp>
         <p:nvSpPr>
-          <p:cNvPr id="101" name="CustomShape 18"/>
+          <p:cNvPr id="105" name="CustomShape 18"/>
           <p:cNvSpPr/>
           <p:nvPr/>
         </p:nvSpPr>
         <p:spPr>
           <a:xfrm>
-            <a:off x="3658320" y="1585800"/>
-            <a:ext cx="1823400" cy="526680"/>
+            <a:off x="3600000" y="1261800"/>
+            <a:ext cx="1881360" cy="526320"/>
           </a:xfrm>
           <a:prstGeom prst="rect">
             <a:avLst/>
@@ -5399,14 +5656,14 @@
       </p:sp>
       <p:sp>
         <p:nvSpPr>
-          <p:cNvPr id="102" name="CustomShape 19"/>
+          <p:cNvPr id="106" name="CustomShape 19"/>
           <p:cNvSpPr/>
           <p:nvPr/>
         </p:nvSpPr>
         <p:spPr>
           <a:xfrm>
-            <a:off x="8591760" y="1585800"/>
-            <a:ext cx="608400" cy="548640"/>
+            <a:off x="8591760" y="1261800"/>
+            <a:ext cx="608040" cy="548280"/>
           </a:xfrm>
           <a:prstGeom prst="rect">
             <a:avLst/>
@@ -5466,14 +5723,14 @@
       </p:sp>
       <p:sp>
         <p:nvSpPr>
-          <p:cNvPr id="103" name="CustomShape 20"/>
+          <p:cNvPr id="107" name="CustomShape 20"/>
           <p:cNvSpPr/>
           <p:nvPr/>
         </p:nvSpPr>
         <p:spPr>
           <a:xfrm>
-            <a:off x="10209600" y="1585800"/>
-            <a:ext cx="913320" cy="532440"/>
+            <a:off x="10209600" y="1261800"/>
+            <a:ext cx="912960" cy="532080"/>
           </a:xfrm>
           <a:prstGeom prst="rect">
             <a:avLst/>
@@ -5522,14 +5779,14 @@
       </p:sp>
       <p:sp>
         <p:nvSpPr>
-          <p:cNvPr id="104" name="CustomShape 21"/>
+          <p:cNvPr id="108" name="CustomShape 21"/>
           <p:cNvSpPr/>
           <p:nvPr/>
         </p:nvSpPr>
         <p:spPr>
           <a:xfrm>
-            <a:off x="2178000" y="5502240"/>
-            <a:ext cx="1961640" cy="333720"/>
+            <a:off x="2178000" y="5178240"/>
+            <a:ext cx="1961280" cy="333360"/>
           </a:xfrm>
           <a:prstGeom prst="rect">
             <a:avLst/>
@@ -5584,14 +5841,14 @@
       </p:sp>
       <p:sp>
         <p:nvSpPr>
-          <p:cNvPr id="105" name="CustomShape 22"/>
+          <p:cNvPr id="109" name="CustomShape 22"/>
           <p:cNvSpPr/>
           <p:nvPr/>
         </p:nvSpPr>
         <p:spPr>
           <a:xfrm>
-            <a:off x="2025360" y="5817960"/>
-            <a:ext cx="2724480" cy="360"/>
+            <a:off x="2025360" y="5493960"/>
+            <a:ext cx="2724120" cy="360"/>
           </a:xfrm>
           <a:custGeom>
             <a:avLst/>
@@ -5627,13 +5884,13 @@
       </p:sp>
       <p:sp>
         <p:nvSpPr>
-          <p:cNvPr id="106" name="Line 23"/>
+          <p:cNvPr id="110" name="Line 23"/>
           <p:cNvSpPr/>
           <p:nvPr/>
         </p:nvSpPr>
         <p:spPr>
           <a:xfrm>
-            <a:off x="4755960" y="2131560"/>
+            <a:off x="4755960" y="1807560"/>
             <a:ext cx="0" cy="4536000"/>
           </a:xfrm>
           <a:prstGeom prst="line">
@@ -5655,13 +5912,13 @@
       </p:sp>
       <p:sp>
         <p:nvSpPr>
-          <p:cNvPr id="107" name="Line 24"/>
+          <p:cNvPr id="111" name="Line 24"/>
           <p:cNvSpPr/>
           <p:nvPr/>
         </p:nvSpPr>
         <p:spPr>
           <a:xfrm>
-            <a:off x="8895960" y="2131560"/>
+            <a:off x="8895960" y="1807560"/>
             <a:ext cx="0" cy="4536000"/>
           </a:xfrm>
           <a:prstGeom prst="line">
@@ -5683,14 +5940,14 @@
       </p:sp>
       <p:sp>
         <p:nvSpPr>
-          <p:cNvPr id="108" name="CustomShape 25"/>
+          <p:cNvPr id="112" name="CustomShape 25"/>
           <p:cNvSpPr/>
           <p:nvPr/>
         </p:nvSpPr>
         <p:spPr>
           <a:xfrm flipH="1">
-            <a:off x="2022840" y="4847400"/>
-            <a:ext cx="2726280" cy="360"/>
+            <a:off x="2022840" y="4523400"/>
+            <a:ext cx="2725920" cy="360"/>
           </a:xfrm>
           <a:custGeom>
             <a:avLst/>
@@ -5726,14 +5983,14 @@
       </p:sp>
       <p:sp>
         <p:nvSpPr>
-          <p:cNvPr id="109" name="CustomShape 26"/>
+          <p:cNvPr id="113" name="CustomShape 26"/>
           <p:cNvSpPr/>
           <p:nvPr/>
         </p:nvSpPr>
         <p:spPr>
           <a:xfrm>
-            <a:off x="2113560" y="5917680"/>
-            <a:ext cx="2562840" cy="212040"/>
+            <a:off x="2113560" y="5593680"/>
+            <a:ext cx="2562480" cy="211680"/>
           </a:xfrm>
           <a:prstGeom prst="rect">
             <a:avLst/>
@@ -5777,14 +6034,14 @@
       </p:sp>
       <p:sp>
         <p:nvSpPr>
-          <p:cNvPr id="110" name="CustomShape 27"/>
+          <p:cNvPr id="114" name="CustomShape 27"/>
           <p:cNvSpPr/>
           <p:nvPr/>
         </p:nvSpPr>
         <p:spPr>
           <a:xfrm>
-            <a:off x="2372400" y="1611360"/>
-            <a:ext cx="1301400" cy="455040"/>
+            <a:off x="2372400" y="1287360"/>
+            <a:ext cx="1047600" cy="454680"/>
           </a:xfrm>
           <a:prstGeom prst="rect">
             <a:avLst/>
@@ -5805,7 +6062,7 @@
             <a:spAutoFit/>
           </a:bodyPr>
           <a:p>
-            <a:pPr marL="85680" indent="-84960">
+            <a:pPr marL="85680" indent="-84600">
               <a:lnSpc>
                 <a:spcPct val="100000"/>
               </a:lnSpc>
@@ -5830,7 +6087,7 @@
             </a:endParaRPr>
           </a:p>
           <a:p>
-            <a:pPr marL="85680" indent="-84960">
+            <a:pPr marL="85680" indent="-84600">
               <a:lnSpc>
                 <a:spcPct val="100000"/>
               </a:lnSpc>
@@ -5858,14 +6115,14 @@
       </p:sp>
       <p:sp>
         <p:nvSpPr>
-          <p:cNvPr id="111" name="CustomShape 28"/>
+          <p:cNvPr id="115" name="CustomShape 28"/>
           <p:cNvSpPr/>
           <p:nvPr/>
         </p:nvSpPr>
         <p:spPr>
           <a:xfrm>
-            <a:off x="5445360" y="1651320"/>
-            <a:ext cx="1569240" cy="455400"/>
+            <a:off x="5445360" y="1327320"/>
+            <a:ext cx="1568880" cy="455040"/>
           </a:xfrm>
           <a:prstGeom prst="rect">
             <a:avLst/>
@@ -5886,7 +6143,7 @@
             <a:spAutoFit/>
           </a:bodyPr>
           <a:p>
-            <a:pPr marL="84960" indent="-84240">
+            <a:pPr marL="84960" indent="-83880">
               <a:lnSpc>
                 <a:spcPct val="100000"/>
               </a:lnSpc>
@@ -5911,7 +6168,7 @@
             </a:endParaRPr>
           </a:p>
           <a:p>
-            <a:pPr marL="84960" indent="-84240">
+            <a:pPr marL="84960" indent="-83880">
               <a:lnSpc>
                 <a:spcPct val="100000"/>
               </a:lnSpc>
@@ -5936,7 +6193,7 @@
             </a:endParaRPr>
           </a:p>
           <a:p>
-            <a:pPr marL="84960" indent="-84240">
+            <a:pPr marL="84960" indent="-83880">
               <a:lnSpc>
                 <a:spcPct val="100000"/>
               </a:lnSpc>
@@ -5964,14 +6221,14 @@
       </p:sp>
       <p:sp>
         <p:nvSpPr>
-          <p:cNvPr id="112" name="CustomShape 29"/>
+          <p:cNvPr id="116" name="CustomShape 29"/>
           <p:cNvSpPr/>
           <p:nvPr/>
         </p:nvSpPr>
         <p:spPr>
           <a:xfrm>
-            <a:off x="9164160" y="1651320"/>
-            <a:ext cx="1009440" cy="333720"/>
+            <a:off x="9164160" y="1327320"/>
+            <a:ext cx="1009080" cy="333360"/>
           </a:xfrm>
           <a:prstGeom prst="rect">
             <a:avLst/>
@@ -5992,7 +6249,7 @@
             <a:spAutoFit/>
           </a:bodyPr>
           <a:p>
-            <a:pPr marL="84960" indent="-84240">
+            <a:pPr marL="84960" indent="-83880">
               <a:lnSpc>
                 <a:spcPct val="100000"/>
               </a:lnSpc>
@@ -6020,14 +6277,14 @@
       </p:sp>
       <p:sp>
         <p:nvSpPr>
-          <p:cNvPr id="113" name="CustomShape 30"/>
+          <p:cNvPr id="117" name="CustomShape 30"/>
           <p:cNvSpPr/>
           <p:nvPr/>
         </p:nvSpPr>
         <p:spPr>
           <a:xfrm>
-            <a:off x="11123640" y="1611360"/>
-            <a:ext cx="977400" cy="333720"/>
+            <a:off x="11123640" y="1287360"/>
+            <a:ext cx="977040" cy="333360"/>
           </a:xfrm>
           <a:prstGeom prst="rect">
             <a:avLst/>
@@ -6048,7 +6305,7 @@
             <a:spAutoFit/>
           </a:bodyPr>
           <a:p>
-            <a:pPr marL="84960" indent="-84240">
+            <a:pPr marL="84960" indent="-83880">
               <a:lnSpc>
                 <a:spcPct val="100000"/>
               </a:lnSpc>
@@ -6076,7 +6333,7 @@
       </p:sp>
       <p:pic>
         <p:nvPicPr>
-          <p:cNvPr id="114" name="Picture 170" descr=""/>
+          <p:cNvPr id="118" name="Picture 170" descr=""/>
           <p:cNvPicPr/>
           <p:nvPr/>
         </p:nvPicPr>
@@ -6086,8 +6343,8 @@
         </p:blipFill>
         <p:spPr>
           <a:xfrm>
-            <a:off x="10173240" y="3469320"/>
-            <a:ext cx="285120" cy="595080"/>
+            <a:off x="10173240" y="3145320"/>
+            <a:ext cx="284760" cy="594720"/>
           </a:xfrm>
           <a:prstGeom prst="rect">
             <a:avLst/>
@@ -6099,13 +6356,13 @@
       </p:pic>
       <p:sp>
         <p:nvSpPr>
-          <p:cNvPr id="115" name="Line 31"/>
+          <p:cNvPr id="119" name="Line 31"/>
           <p:cNvSpPr/>
           <p:nvPr/>
         </p:nvSpPr>
         <p:spPr>
           <a:xfrm>
-            <a:off x="1828440" y="4341240"/>
+            <a:off x="1828440" y="4017240"/>
             <a:ext cx="8811720" cy="24120"/>
           </a:xfrm>
           <a:prstGeom prst="line">
@@ -6127,14 +6384,14 @@
       </p:sp>
       <p:sp>
         <p:nvSpPr>
-          <p:cNvPr id="116" name="CustomShape 32"/>
+          <p:cNvPr id="120" name="CustomShape 32"/>
           <p:cNvSpPr/>
           <p:nvPr/>
         </p:nvSpPr>
         <p:spPr>
           <a:xfrm>
-            <a:off x="169200" y="2639880"/>
-            <a:ext cx="732600" cy="1063800"/>
+            <a:off x="169200" y="2315880"/>
+            <a:ext cx="732240" cy="1063440"/>
           </a:xfrm>
           <a:prstGeom prst="rect">
             <a:avLst/>
@@ -6193,14 +6450,14 @@
       </p:sp>
       <p:sp>
         <p:nvSpPr>
-          <p:cNvPr id="117" name="CustomShape 33"/>
+          <p:cNvPr id="121" name="CustomShape 33"/>
           <p:cNvSpPr/>
           <p:nvPr/>
         </p:nvSpPr>
         <p:spPr>
           <a:xfrm>
-            <a:off x="172800" y="4522320"/>
-            <a:ext cx="1266840" cy="820440"/>
+            <a:off x="172800" y="4198320"/>
+            <a:ext cx="1266480" cy="820080"/>
           </a:xfrm>
           <a:prstGeom prst="rect">
             <a:avLst/>
@@ -6248,7 +6505,7 @@
       </p:sp>
       <p:pic>
         <p:nvPicPr>
-          <p:cNvPr id="118" name="Picture 177" descr=""/>
+          <p:cNvPr id="122" name="Picture 177" descr=""/>
           <p:cNvPicPr/>
           <p:nvPr/>
         </p:nvPicPr>
@@ -6258,8 +6515,8 @@
         </p:blipFill>
         <p:spPr>
           <a:xfrm>
-            <a:off x="1928160" y="3559680"/>
-            <a:ext cx="285120" cy="595080"/>
+            <a:off x="1928160" y="3235680"/>
+            <a:ext cx="284760" cy="594720"/>
           </a:xfrm>
           <a:prstGeom prst="rect">
             <a:avLst/>
@@ -6271,7 +6528,7 @@
       </p:pic>
       <p:pic>
         <p:nvPicPr>
-          <p:cNvPr id="119" name="Picture 178" descr=""/>
+          <p:cNvPr id="123" name="Picture 178" descr=""/>
           <p:cNvPicPr/>
           <p:nvPr/>
         </p:nvPicPr>
@@ -6281,8 +6538,8 @@
         </p:blipFill>
         <p:spPr>
           <a:xfrm>
-            <a:off x="1522800" y="2416680"/>
-            <a:ext cx="693720" cy="701280"/>
+            <a:off x="1522800" y="2092680"/>
+            <a:ext cx="693360" cy="700920"/>
           </a:xfrm>
           <a:prstGeom prst="rect">
             <a:avLst/>
@@ -6294,7 +6551,7 @@
       </p:pic>
       <p:pic>
         <p:nvPicPr>
-          <p:cNvPr id="120" name="Picture 179" descr=""/>
+          <p:cNvPr id="124" name="Picture 179" descr=""/>
           <p:cNvPicPr/>
           <p:nvPr/>
         </p:nvPicPr>
@@ -6304,8 +6561,8 @@
         </p:blipFill>
         <p:spPr>
           <a:xfrm>
-            <a:off x="4848840" y="2836080"/>
-            <a:ext cx="790560" cy="760320"/>
+            <a:off x="4848840" y="2512080"/>
+            <a:ext cx="790200" cy="759960"/>
           </a:xfrm>
           <a:prstGeom prst="rect">
             <a:avLst/>
@@ -6317,14 +6574,14 @@
       </p:pic>
       <p:sp>
         <p:nvSpPr>
-          <p:cNvPr id="121" name="CustomShape 34"/>
+          <p:cNvPr id="125" name="CustomShape 34"/>
           <p:cNvSpPr/>
           <p:nvPr/>
         </p:nvSpPr>
         <p:spPr>
           <a:xfrm>
-            <a:off x="2042280" y="4449240"/>
-            <a:ext cx="2562840" cy="211680"/>
+            <a:off x="2042280" y="4125240"/>
+            <a:ext cx="2562480" cy="211320"/>
           </a:xfrm>
           <a:prstGeom prst="rect">
             <a:avLst/>
@@ -6368,14 +6625,14 @@
       </p:sp>
       <p:sp>
         <p:nvSpPr>
-          <p:cNvPr id="122" name="CustomShape 35"/>
+          <p:cNvPr id="126" name="CustomShape 35"/>
           <p:cNvSpPr/>
           <p:nvPr/>
         </p:nvSpPr>
         <p:spPr>
           <a:xfrm>
-            <a:off x="2025360" y="4626000"/>
-            <a:ext cx="2724480" cy="360"/>
+            <a:off x="2025360" y="4302000"/>
+            <a:ext cx="2724120" cy="360"/>
           </a:xfrm>
           <a:custGeom>
             <a:avLst/>
@@ -6411,14 +6668,14 @@
       </p:sp>
       <p:sp>
         <p:nvSpPr>
-          <p:cNvPr id="123" name="CustomShape 36"/>
+          <p:cNvPr id="127" name="CustomShape 36"/>
           <p:cNvSpPr/>
           <p:nvPr/>
         </p:nvSpPr>
         <p:spPr>
           <a:xfrm>
-            <a:off x="2042280" y="4660920"/>
-            <a:ext cx="2562840" cy="211680"/>
+            <a:off x="2042280" y="4336920"/>
+            <a:ext cx="2562480" cy="211320"/>
           </a:xfrm>
           <a:prstGeom prst="rect">
             <a:avLst/>
@@ -6462,14 +6719,14 @@
       </p:sp>
       <p:sp>
         <p:nvSpPr>
-          <p:cNvPr id="124" name="CustomShape 37"/>
+          <p:cNvPr id="128" name="CustomShape 37"/>
           <p:cNvSpPr/>
           <p:nvPr/>
         </p:nvSpPr>
         <p:spPr>
           <a:xfrm flipH="1">
-            <a:off x="2022840" y="6121800"/>
-            <a:ext cx="2726280" cy="360"/>
+            <a:off x="2022840" y="5797800"/>
+            <a:ext cx="2725920" cy="360"/>
           </a:xfrm>
           <a:custGeom>
             <a:avLst/>
@@ -6505,14 +6762,14 @@
       </p:sp>
       <p:sp>
         <p:nvSpPr>
-          <p:cNvPr id="125" name="CustomShape 38"/>
+          <p:cNvPr id="129" name="CustomShape 38"/>
           <p:cNvSpPr/>
           <p:nvPr/>
         </p:nvSpPr>
         <p:spPr>
           <a:xfrm flipH="1">
-            <a:off x="2022840" y="5347440"/>
-            <a:ext cx="2726280" cy="360"/>
+            <a:off x="2022840" y="5023440"/>
+            <a:ext cx="2725920" cy="360"/>
           </a:xfrm>
           <a:custGeom>
             <a:avLst/>
@@ -6548,14 +6805,14 @@
       </p:sp>
       <p:sp>
         <p:nvSpPr>
-          <p:cNvPr id="126" name="CustomShape 39"/>
+          <p:cNvPr id="130" name="CustomShape 39"/>
           <p:cNvSpPr/>
           <p:nvPr/>
         </p:nvSpPr>
         <p:spPr>
           <a:xfrm>
-            <a:off x="2042280" y="4949280"/>
-            <a:ext cx="2562840" cy="211680"/>
+            <a:off x="2042280" y="4625280"/>
+            <a:ext cx="2562480" cy="211320"/>
           </a:xfrm>
           <a:prstGeom prst="rect">
             <a:avLst/>
@@ -6599,14 +6856,14 @@
       </p:sp>
       <p:sp>
         <p:nvSpPr>
-          <p:cNvPr id="127" name="CustomShape 40"/>
+          <p:cNvPr id="131" name="CustomShape 40"/>
           <p:cNvSpPr/>
           <p:nvPr/>
         </p:nvSpPr>
         <p:spPr>
           <a:xfrm>
-            <a:off x="2025360" y="5126040"/>
-            <a:ext cx="2724480" cy="360"/>
+            <a:off x="2025360" y="4802040"/>
+            <a:ext cx="2724120" cy="360"/>
           </a:xfrm>
           <a:custGeom>
             <a:avLst/>
@@ -6642,14 +6899,14 @@
       </p:sp>
       <p:sp>
         <p:nvSpPr>
-          <p:cNvPr id="128" name="CustomShape 41"/>
+          <p:cNvPr id="132" name="CustomShape 41"/>
           <p:cNvSpPr/>
           <p:nvPr/>
         </p:nvSpPr>
         <p:spPr>
           <a:xfrm>
-            <a:off x="2042280" y="5160960"/>
-            <a:ext cx="2562840" cy="211680"/>
+            <a:off x="2042280" y="4836960"/>
+            <a:ext cx="2562480" cy="211320"/>
           </a:xfrm>
           <a:prstGeom prst="rect">
             <a:avLst/>
@@ -6693,7 +6950,7 @@
       </p:sp>
       <p:pic>
         <p:nvPicPr>
-          <p:cNvPr id="129" name="Picture 188" descr=""/>
+          <p:cNvPr id="133" name="Picture 188" descr=""/>
           <p:cNvPicPr/>
           <p:nvPr/>
         </p:nvPicPr>
@@ -6703,8 +6960,8 @@
         </p:blipFill>
         <p:spPr>
           <a:xfrm>
-            <a:off x="1655280" y="5452560"/>
-            <a:ext cx="485640" cy="527760"/>
+            <a:off x="1655280" y="5128560"/>
+            <a:ext cx="485280" cy="527400"/>
           </a:xfrm>
           <a:prstGeom prst="rect">
             <a:avLst/>
@@ -6716,14 +6973,14 @@
       </p:pic>
       <p:sp>
         <p:nvSpPr>
-          <p:cNvPr id="130" name="CustomShape 42"/>
+          <p:cNvPr id="134" name="CustomShape 42"/>
           <p:cNvSpPr/>
           <p:nvPr/>
         </p:nvSpPr>
         <p:spPr>
           <a:xfrm>
-            <a:off x="1672920" y="6000480"/>
-            <a:ext cx="324000" cy="239400"/>
+            <a:off x="1672920" y="5676480"/>
+            <a:ext cx="323640" cy="239040"/>
           </a:xfrm>
           <a:prstGeom prst="rect">
             <a:avLst/>
@@ -6747,7 +7004,7 @@
       </p:sp>
       <p:pic>
         <p:nvPicPr>
-          <p:cNvPr id="131" name="Graphic 190" descr=""/>
+          <p:cNvPr id="135" name="Graphic 190" descr=""/>
           <p:cNvPicPr/>
           <p:nvPr/>
         </p:nvPicPr>
@@ -6757,8 +7014,8 @@
         </p:blipFill>
         <p:spPr>
           <a:xfrm>
-            <a:off x="1672920" y="5961240"/>
-            <a:ext cx="309600" cy="309600"/>
+            <a:off x="1672920" y="5637240"/>
+            <a:ext cx="309240" cy="309240"/>
           </a:xfrm>
           <a:prstGeom prst="rect">
             <a:avLst/>
@@ -6770,7 +7027,7 @@
       </p:pic>
       <p:pic>
         <p:nvPicPr>
-          <p:cNvPr id="132" name="Graphic 191" descr=""/>
+          <p:cNvPr id="136" name="Graphic 191" descr=""/>
           <p:cNvPicPr/>
           <p:nvPr/>
         </p:nvPicPr>
@@ -6780,8 +7037,8 @@
         </p:blipFill>
         <p:spPr>
           <a:xfrm>
-            <a:off x="8944560" y="5963400"/>
-            <a:ext cx="309600" cy="309600"/>
+            <a:off x="8944560" y="5639400"/>
+            <a:ext cx="309240" cy="309240"/>
           </a:xfrm>
           <a:prstGeom prst="rect">
             <a:avLst/>
@@ -6793,14 +7050,14 @@
       </p:pic>
       <p:sp>
         <p:nvSpPr>
-          <p:cNvPr id="133" name="CustomShape 43"/>
+          <p:cNvPr id="137" name="CustomShape 43"/>
           <p:cNvSpPr/>
           <p:nvPr/>
         </p:nvSpPr>
         <p:spPr>
           <a:xfrm>
-            <a:off x="1045080" y="6340320"/>
-            <a:ext cx="1040040" cy="333720"/>
+            <a:off x="1045080" y="6016320"/>
+            <a:ext cx="1039680" cy="333360"/>
           </a:xfrm>
           <a:prstGeom prst="rect">
             <a:avLst/>
@@ -6844,14 +7101,14 @@
       </p:sp>
       <p:sp>
         <p:nvSpPr>
-          <p:cNvPr id="134" name="CustomShape 44"/>
+          <p:cNvPr id="138" name="CustomShape 44"/>
           <p:cNvSpPr/>
           <p:nvPr/>
         </p:nvSpPr>
         <p:spPr>
           <a:xfrm>
-            <a:off x="6300000" y="5486400"/>
-            <a:ext cx="1943640" cy="333720"/>
+            <a:off x="6300000" y="5162400"/>
+            <a:ext cx="1943280" cy="333360"/>
           </a:xfrm>
           <a:prstGeom prst="rect">
             <a:avLst/>
@@ -6895,14 +7152,14 @@
       </p:sp>
       <p:sp>
         <p:nvSpPr>
-          <p:cNvPr id="135" name="CustomShape 45"/>
+          <p:cNvPr id="139" name="CustomShape 45"/>
           <p:cNvSpPr/>
           <p:nvPr/>
         </p:nvSpPr>
         <p:spPr>
           <a:xfrm>
-            <a:off x="2025360" y="4179960"/>
-            <a:ext cx="2715480" cy="360"/>
+            <a:off x="2025360" y="3855960"/>
+            <a:ext cx="2715120" cy="360"/>
           </a:xfrm>
           <a:custGeom>
             <a:avLst/>
@@ -6938,14 +7195,14 @@
       </p:sp>
       <p:sp>
         <p:nvSpPr>
-          <p:cNvPr id="136" name="CustomShape 46"/>
+          <p:cNvPr id="140" name="CustomShape 46"/>
           <p:cNvSpPr/>
           <p:nvPr/>
         </p:nvSpPr>
         <p:spPr>
           <a:xfrm>
-            <a:off x="2673720" y="3997440"/>
-            <a:ext cx="1401480" cy="211680"/>
+            <a:off x="2673720" y="3673440"/>
+            <a:ext cx="1401120" cy="211320"/>
           </a:xfrm>
           <a:prstGeom prst="rect">
             <a:avLst/>
@@ -6989,14 +7246,14 @@
       </p:sp>
       <p:sp>
         <p:nvSpPr>
-          <p:cNvPr id="137" name="CustomShape 47"/>
+          <p:cNvPr id="141" name="CustomShape 47"/>
           <p:cNvSpPr/>
           <p:nvPr/>
         </p:nvSpPr>
         <p:spPr>
           <a:xfrm>
-            <a:off x="2025360" y="6534720"/>
-            <a:ext cx="2715480" cy="360"/>
+            <a:off x="2025360" y="6210720"/>
+            <a:ext cx="2715120" cy="360"/>
           </a:xfrm>
           <a:custGeom>
             <a:avLst/>
@@ -7032,14 +7289,14 @@
       </p:sp>
       <p:sp>
         <p:nvSpPr>
-          <p:cNvPr id="138" name="CustomShape 48"/>
+          <p:cNvPr id="142" name="CustomShape 48"/>
           <p:cNvSpPr/>
           <p:nvPr/>
         </p:nvSpPr>
         <p:spPr>
           <a:xfrm>
-            <a:off x="2673720" y="6316200"/>
-            <a:ext cx="1401480" cy="211680"/>
+            <a:off x="2673720" y="5992200"/>
+            <a:ext cx="1401120" cy="211320"/>
           </a:xfrm>
           <a:prstGeom prst="rect">
             <a:avLst/>
@@ -7083,14 +7340,14 @@
       </p:sp>
       <p:sp>
         <p:nvSpPr>
-          <p:cNvPr id="139" name="CustomShape 49"/>
+          <p:cNvPr id="143" name="CustomShape 49"/>
           <p:cNvSpPr/>
           <p:nvPr/>
         </p:nvSpPr>
         <p:spPr>
           <a:xfrm>
-            <a:off x="7003440" y="1585800"/>
-            <a:ext cx="592200" cy="548640"/>
+            <a:off x="7003440" y="1261800"/>
+            <a:ext cx="591840" cy="548280"/>
           </a:xfrm>
           <a:prstGeom prst="rect">
             <a:avLst/>
@@ -7150,14 +7407,14 @@
       </p:sp>
       <p:sp>
         <p:nvSpPr>
-          <p:cNvPr id="140" name="CustomShape 50"/>
+          <p:cNvPr id="144" name="CustomShape 50"/>
           <p:cNvSpPr/>
           <p:nvPr/>
         </p:nvSpPr>
         <p:spPr>
           <a:xfrm>
-            <a:off x="7544160" y="1667520"/>
-            <a:ext cx="1009440" cy="333720"/>
+            <a:off x="7544160" y="1343520"/>
+            <a:ext cx="1009080" cy="333360"/>
           </a:xfrm>
           <a:prstGeom prst="rect">
             <a:avLst/>
@@ -7178,7 +7435,7 @@
             <a:spAutoFit/>
           </a:bodyPr>
           <a:p>
-            <a:pPr marL="84960" indent="-84240">
+            <a:pPr marL="84960" indent="-83880">
               <a:lnSpc>
                 <a:spcPct val="100000"/>
               </a:lnSpc>
@@ -7206,13 +7463,13 @@
       </p:sp>
       <p:sp>
         <p:nvSpPr>
-          <p:cNvPr id="141" name="Line 51"/>
+          <p:cNvPr id="145" name="Line 51"/>
           <p:cNvSpPr/>
           <p:nvPr/>
         </p:nvSpPr>
         <p:spPr>
           <a:xfrm>
-            <a:off x="7291800" y="2139480"/>
+            <a:off x="7291800" y="1815480"/>
             <a:ext cx="0" cy="4536360"/>
           </a:xfrm>
           <a:prstGeom prst="line">
@@ -7234,14 +7491,14 @@
       </p:sp>
       <p:sp>
         <p:nvSpPr>
-          <p:cNvPr id="142" name="CustomShape 52"/>
+          <p:cNvPr id="146" name="CustomShape 52"/>
           <p:cNvSpPr/>
           <p:nvPr/>
         </p:nvSpPr>
         <p:spPr>
           <a:xfrm>
-            <a:off x="7297920" y="5833800"/>
-            <a:ext cx="1597680" cy="360"/>
+            <a:off x="7297920" y="5509800"/>
+            <a:ext cx="1597320" cy="360"/>
           </a:xfrm>
           <a:custGeom>
             <a:avLst/>
@@ -7277,14 +7534,14 @@
       </p:sp>
       <p:sp>
         <p:nvSpPr>
-          <p:cNvPr id="143" name="CustomShape 53"/>
+          <p:cNvPr id="147" name="CustomShape 53"/>
           <p:cNvSpPr/>
           <p:nvPr/>
         </p:nvSpPr>
         <p:spPr>
           <a:xfrm flipH="1" flipV="1">
-            <a:off x="7288920" y="6113160"/>
-            <a:ext cx="1581840" cy="360"/>
+            <a:off x="7288200" y="5788440"/>
+            <a:ext cx="1581480" cy="360"/>
           </a:xfrm>
           <a:custGeom>
             <a:avLst/>
@@ -7320,14 +7577,14 @@
       </p:sp>
       <p:sp>
         <p:nvSpPr>
-          <p:cNvPr id="144" name="CustomShape 54"/>
+          <p:cNvPr id="148" name="CustomShape 54"/>
           <p:cNvSpPr/>
           <p:nvPr/>
         </p:nvSpPr>
         <p:spPr>
           <a:xfrm>
-            <a:off x="4041720" y="5490720"/>
-            <a:ext cx="1465920" cy="333720"/>
+            <a:off x="4041720" y="5166720"/>
+            <a:ext cx="1465560" cy="333360"/>
           </a:xfrm>
           <a:prstGeom prst="rect">
             <a:avLst/>
@@ -7382,14 +7639,14 @@
       </p:sp>
       <p:sp>
         <p:nvSpPr>
-          <p:cNvPr id="145" name="CustomShape 55"/>
+          <p:cNvPr id="149" name="CustomShape 55"/>
           <p:cNvSpPr/>
           <p:nvPr/>
         </p:nvSpPr>
         <p:spPr>
           <a:xfrm>
-            <a:off x="4803120" y="4630680"/>
-            <a:ext cx="2496240" cy="15480"/>
+            <a:off x="4803120" y="4306680"/>
+            <a:ext cx="2495880" cy="15120"/>
           </a:xfrm>
           <a:custGeom>
             <a:avLst/>
@@ -7426,14 +7683,14 @@
       </p:sp>
       <p:sp>
         <p:nvSpPr>
-          <p:cNvPr id="146" name="CustomShape 56"/>
+          <p:cNvPr id="150" name="CustomShape 56"/>
           <p:cNvSpPr/>
           <p:nvPr/>
         </p:nvSpPr>
         <p:spPr>
           <a:xfrm flipH="1" flipV="1">
-            <a:off x="4802400" y="4862880"/>
-            <a:ext cx="2472120" cy="7200"/>
+            <a:off x="4802400" y="4538160"/>
+            <a:ext cx="2471760" cy="6840"/>
           </a:xfrm>
           <a:custGeom>
             <a:avLst/>
@@ -7470,14 +7727,14 @@
       </p:sp>
       <p:sp>
         <p:nvSpPr>
-          <p:cNvPr id="147" name="CustomShape 57"/>
+          <p:cNvPr id="151" name="CustomShape 57"/>
           <p:cNvSpPr/>
           <p:nvPr/>
         </p:nvSpPr>
         <p:spPr>
           <a:xfrm>
-            <a:off x="4771080" y="5136120"/>
-            <a:ext cx="2496240" cy="15480"/>
+            <a:off x="4771080" y="4812120"/>
+            <a:ext cx="2495880" cy="15120"/>
           </a:xfrm>
           <a:custGeom>
             <a:avLst/>
@@ -7514,14 +7771,14 @@
       </p:sp>
       <p:sp>
         <p:nvSpPr>
-          <p:cNvPr id="148" name="CustomShape 58"/>
+          <p:cNvPr id="152" name="CustomShape 58"/>
           <p:cNvSpPr/>
           <p:nvPr/>
         </p:nvSpPr>
         <p:spPr>
           <a:xfrm flipH="1" flipV="1">
-            <a:off x="4794480" y="5343840"/>
-            <a:ext cx="2472120" cy="7200"/>
+            <a:off x="4794480" y="5019120"/>
+            <a:ext cx="2471760" cy="6840"/>
           </a:xfrm>
           <a:custGeom>
             <a:avLst/>
@@ -7558,14 +7815,14 @@
       </p:sp>
       <p:sp>
         <p:nvSpPr>
-          <p:cNvPr id="149" name="CustomShape 59"/>
+          <p:cNvPr id="153" name="CustomShape 59"/>
           <p:cNvSpPr/>
           <p:nvPr/>
         </p:nvSpPr>
         <p:spPr>
           <a:xfrm>
-            <a:off x="600480" y="766800"/>
-            <a:ext cx="9863280" cy="575280"/>
+            <a:off x="600480" y="442800"/>
+            <a:ext cx="9862920" cy="574920"/>
           </a:xfrm>
           <a:prstGeom prst="rect">
             <a:avLst/>
@@ -7584,14 +7841,14 @@
       </p:sp>
       <p:sp>
         <p:nvSpPr>
-          <p:cNvPr id="150" name="CustomShape 60"/>
+          <p:cNvPr id="154" name="CustomShape 60"/>
           <p:cNvSpPr/>
           <p:nvPr/>
         </p:nvSpPr>
         <p:spPr>
           <a:xfrm flipV="1">
-            <a:off x="4770720" y="4253760"/>
-            <a:ext cx="5837400" cy="17280"/>
+            <a:off x="4770720" y="3928680"/>
+            <a:ext cx="5837040" cy="16920"/>
           </a:xfrm>
           <a:custGeom>
             <a:avLst/>
@@ -7627,14 +7884,14 @@
       </p:sp>
       <p:sp>
         <p:nvSpPr>
-          <p:cNvPr id="151" name="CustomShape 61"/>
+          <p:cNvPr id="155" name="CustomShape 61"/>
           <p:cNvSpPr/>
           <p:nvPr/>
         </p:nvSpPr>
         <p:spPr>
           <a:xfrm>
-            <a:off x="7342560" y="4081680"/>
-            <a:ext cx="1155960" cy="211680"/>
+            <a:off x="7342560" y="3757680"/>
+            <a:ext cx="1155600" cy="211320"/>
           </a:xfrm>
           <a:prstGeom prst="rect">
             <a:avLst/>
@@ -7678,14 +7935,14 @@
       </p:sp>
       <p:sp>
         <p:nvSpPr>
-          <p:cNvPr id="152" name="CustomShape 62"/>
+          <p:cNvPr id="156" name="CustomShape 62"/>
           <p:cNvSpPr/>
           <p:nvPr/>
         </p:nvSpPr>
         <p:spPr>
           <a:xfrm>
-            <a:off x="838440" y="185400"/>
-            <a:ext cx="10514880" cy="1324800"/>
+            <a:off x="838440" y="5400"/>
+            <a:ext cx="10514520" cy="1324440"/>
           </a:xfrm>
           <a:prstGeom prst="rect">
             <a:avLst/>
@@ -7717,6 +7974,7 @@
                   <a:srgbClr val="000000"/>
                 </a:solidFill>
                 <a:latin typeface="Calibri Light"/>
+                <a:ea typeface="DejaVu Sans"/>
               </a:rPr>
               <a:t>BRSKI-AE: abstract protocol overview</a:t>
             </a:r>
@@ -7728,14 +7986,14 @@
       </p:sp>
       <p:sp>
         <p:nvSpPr>
-          <p:cNvPr id="153" name="CustomShape 63"/>
+          <p:cNvPr id="157" name="CustomShape 63"/>
           <p:cNvSpPr/>
           <p:nvPr/>
         </p:nvSpPr>
         <p:spPr>
           <a:xfrm>
-            <a:off x="72000" y="4320000"/>
-            <a:ext cx="8279640" cy="1979640"/>
+            <a:off x="72000" y="3996000"/>
+            <a:ext cx="8279280" cy="1979280"/>
           </a:xfrm>
           <a:custGeom>
             <a:avLst/>
@@ -7858,14 +8116,14 @@
       </p:sp>
       <p:sp>
         <p:nvSpPr>
-          <p:cNvPr id="154" name="CustomShape 64"/>
+          <p:cNvPr id="158" name="CustomShape 64"/>
           <p:cNvSpPr/>
           <p:nvPr/>
         </p:nvSpPr>
         <p:spPr>
           <a:xfrm>
-            <a:off x="4771080" y="5828040"/>
-            <a:ext cx="2496240" cy="15480"/>
+            <a:off x="4771080" y="5504040"/>
+            <a:ext cx="2495880" cy="15120"/>
           </a:xfrm>
           <a:custGeom>
             <a:avLst/>
@@ -7902,14 +8160,14 @@
       </p:sp>
       <p:sp>
         <p:nvSpPr>
-          <p:cNvPr id="155" name="CustomShape 65"/>
+          <p:cNvPr id="159" name="CustomShape 65"/>
           <p:cNvSpPr/>
           <p:nvPr/>
         </p:nvSpPr>
         <p:spPr>
           <a:xfrm flipH="1" flipV="1">
-            <a:off x="4794480" y="6096600"/>
-            <a:ext cx="2472120" cy="7200"/>
+            <a:off x="4794480" y="5771880"/>
+            <a:ext cx="2471760" cy="6840"/>
           </a:xfrm>
           <a:custGeom>
             <a:avLst/>
@@ -7976,14 +8234,14 @@
       </p:grpSpPr>
       <p:sp>
         <p:nvSpPr>
-          <p:cNvPr id="156" name="CustomShape 1"/>
+          <p:cNvPr id="160" name="CustomShape 1"/>
           <p:cNvSpPr/>
           <p:nvPr/>
         </p:nvSpPr>
         <p:spPr>
           <a:xfrm>
             <a:off x="838080" y="365040"/>
-            <a:ext cx="10514880" cy="1324800"/>
+            <a:ext cx="10514520" cy="1324440"/>
           </a:xfrm>
           <a:prstGeom prst="rect">
             <a:avLst/>
@@ -8015,6 +8273,7 @@
                   <a:srgbClr val="000000"/>
                 </a:solidFill>
                 <a:latin typeface="Calibri Light"/>
+                <a:ea typeface="DejaVu Sans"/>
               </a:rPr>
               <a:t>BRSKI-AE status: recent changes</a:t>
             </a:r>
@@ -8026,14 +8285,14 @@
       </p:sp>
       <p:sp>
         <p:nvSpPr>
-          <p:cNvPr id="157" name="CustomShape 2"/>
+          <p:cNvPr id="161" name="CustomShape 2"/>
           <p:cNvSpPr/>
           <p:nvPr/>
         </p:nvSpPr>
         <p:spPr>
           <a:xfrm>
             <a:off x="838080" y="1825560"/>
-            <a:ext cx="10397520" cy="4666680"/>
+            <a:ext cx="10397160" cy="4666320"/>
           </a:xfrm>
           <a:prstGeom prst="rect">
             <a:avLst/>
@@ -8068,6 +8327,7 @@
                   <a:srgbClr val="000000"/>
                 </a:solidFill>
                 <a:latin typeface="Calibri"/>
+                <a:ea typeface="DejaVu Sans"/>
               </a:rPr>
               <a:t>From draft version 04 to version 05:</a:t>
             </a:r>
@@ -8076,7 +8336,7 @@
             </a:endParaRPr>
           </a:p>
           <a:p>
-            <a:pPr marL="228600" indent="-227880">
+            <a:pPr marL="228600" indent="-227520">
               <a:lnSpc>
                 <a:spcPct val="100000"/>
               </a:lnSpc>
@@ -8095,6 +8355,7 @@
                   <a:srgbClr val="000000"/>
                 </a:solidFill>
                 <a:latin typeface="Calibri"/>
+                <a:ea typeface="DejaVu Sans"/>
               </a:rPr>
               <a:t>After the split with BRSKI-PRM, David von Oheimb became the editor.</a:t>
             </a:r>
@@ -8103,7 +8364,7 @@
             </a:endParaRPr>
           </a:p>
           <a:p>
-            <a:pPr marL="228600" indent="-227880">
+            <a:pPr marL="228600" indent="-227520">
               <a:lnSpc>
                 <a:spcPct val="100000"/>
               </a:lnSpc>
@@ -8122,15 +8383,16 @@
                   <a:srgbClr val="000000"/>
                 </a:solidFill>
                 <a:latin typeface="Calibri"/>
-              </a:rPr>
-              <a:t>Streamline wording, consolidate terminology, improve grammar, etc.</a:t>
+                <a:ea typeface="DejaVu Sans"/>
+              </a:rPr>
+              <a:t>Shifted the emphasis towards supporting alternative enrollment protocols.</a:t>
             </a:r>
             <a:endParaRPr b="0" lang="en-US" sz="2200" spc="-1" strike="noStrike">
               <a:latin typeface="Arial"/>
             </a:endParaRPr>
           </a:p>
           <a:p>
-            <a:pPr marL="228600" indent="-227880">
+            <a:pPr marL="228600" indent="-227520">
               <a:lnSpc>
                 <a:spcPct val="100000"/>
               </a:lnSpc>
@@ -8149,15 +8411,16 @@
                   <a:srgbClr val="000000"/>
                 </a:solidFill>
                 <a:latin typeface="Calibri"/>
-              </a:rPr>
-              <a:t>Shift the emphasis towards supporting alternative enrollment protocols.</a:t>
+                <a:ea typeface="DejaVu Sans"/>
+              </a:rPr>
+              <a:t>Updated the title accordingly - preliminary change to be approved.</a:t>
             </a:r>
             <a:endParaRPr b="0" lang="en-US" sz="2200" spc="-1" strike="noStrike">
               <a:latin typeface="Arial"/>
             </a:endParaRPr>
           </a:p>
           <a:p>
-            <a:pPr marL="228600" indent="-227880">
+            <a:pPr marL="228600" indent="-227520">
               <a:lnSpc>
                 <a:spcPct val="100000"/>
               </a:lnSpc>
@@ -8176,15 +8439,16 @@
                   <a:srgbClr val="000000"/>
                 </a:solidFill>
                 <a:latin typeface="Calibri"/>
-              </a:rPr>
-              <a:t>Update the title accordingly - preliminary change to be approved.</a:t>
+                <a:ea typeface="DejaVu Sans"/>
+              </a:rPr>
+              <a:t>Moved comments on EST and detailed application examples to informative annex.</a:t>
             </a:r>
             <a:endParaRPr b="0" lang="en-US" sz="2200" spc="-1" strike="noStrike">
               <a:latin typeface="Arial"/>
             </a:endParaRPr>
           </a:p>
           <a:p>
-            <a:pPr marL="228600" indent="-227880">
+            <a:pPr marL="228600" indent="-227520">
               <a:lnSpc>
                 <a:spcPct val="100000"/>
               </a:lnSpc>
@@ -8203,15 +8467,16 @@
                   <a:srgbClr val="000000"/>
                 </a:solidFill>
                 <a:latin typeface="Calibri"/>
-              </a:rPr>
-              <a:t>Move comments on EST and detailed application examples to informative annex.</a:t>
+                <a:ea typeface="DejaVu Sans"/>
+              </a:rPr>
+              <a:t>Moved the remaining text of section 3 as two new sub-sections of section 1.</a:t>
             </a:r>
             <a:endParaRPr b="0" lang="en-US" sz="2200" spc="-1" strike="noStrike">
               <a:latin typeface="Arial"/>
             </a:endParaRPr>
           </a:p>
           <a:p>
-            <a:pPr marL="228600" indent="-227880">
+            <a:pPr marL="228600" indent="-227520">
               <a:lnSpc>
                 <a:spcPct val="100000"/>
               </a:lnSpc>
@@ -8230,8 +8495,9 @@
                   <a:srgbClr val="000000"/>
                 </a:solidFill>
                 <a:latin typeface="Calibri"/>
-              </a:rPr>
-              <a:t>Move the remaining text of section 3 as two new sub-sections of section 1.</a:t>
+                <a:ea typeface="DejaVu Sans"/>
+              </a:rPr>
+              <a:t>Streamlined wording, consolidated terminology, improved grammar, etc.</a:t>
             </a:r>
             <a:endParaRPr b="0" lang="en-US" sz="2200" spc="-1" strike="noStrike">
               <a:latin typeface="Arial"/>
@@ -8247,108 +8513,6 @@
               </a:spcBef>
             </a:pPr>
             <a:endParaRPr b="0" lang="en-US" sz="2200" spc="-1" strike="noStrike">
-              <a:latin typeface="Arial"/>
-            </a:endParaRPr>
-          </a:p>
-        </p:txBody>
-      </p:sp>
-      <p:sp>
-        <p:nvSpPr>
-          <p:cNvPr id="158" name="CustomShape 3"/>
-          <p:cNvSpPr/>
-          <p:nvPr/>
-        </p:nvSpPr>
-        <p:spPr>
-          <a:xfrm>
-            <a:off x="838080" y="6356520"/>
-            <a:ext cx="2742480" cy="364320"/>
-          </a:xfrm>
-          <a:prstGeom prst="rect">
-            <a:avLst/>
-          </a:prstGeom>
-          <a:noFill/>
-          <a:ln w="0">
-            <a:noFill/>
-          </a:ln>
-        </p:spPr>
-        <p:style>
-          <a:lnRef idx="0"/>
-          <a:fillRef idx="0"/>
-          <a:effectRef idx="0"/>
-          <a:fontRef idx="minor"/>
-        </p:style>
-        <p:txBody>
-          <a:bodyPr lIns="90000" rIns="90000" tIns="45000" bIns="45000" anchor="ctr">
-            <a:noAutofit/>
-          </a:bodyPr>
-          <a:p>
-            <a:pPr>
-              <a:lnSpc>
-                <a:spcPct val="100000"/>
-              </a:lnSpc>
-            </a:pPr>
-            <a:fld id="{56141CB1-A9A1-480F-8982-56856D14A6E5}" type="datetime">
-              <a:rPr b="0" lang="en-US" sz="1200" spc="-1" strike="noStrike">
-                <a:solidFill>
-                  <a:srgbClr val="8b8b8b"/>
-                </a:solidFill>
-                <a:latin typeface="Calibri"/>
-                <a:ea typeface="DejaVu Sans"/>
-              </a:rPr>
-              <a:t>3/10/22</a:t>
-            </a:fld>
-            <a:endParaRPr b="0" lang="en-US" sz="1200" spc="-1" strike="noStrike">
-              <a:latin typeface="Arial"/>
-            </a:endParaRPr>
-          </a:p>
-        </p:txBody>
-      </p:sp>
-      <p:sp>
-        <p:nvSpPr>
-          <p:cNvPr id="159" name="CustomShape 4"/>
-          <p:cNvSpPr/>
-          <p:nvPr/>
-        </p:nvSpPr>
-        <p:spPr>
-          <a:xfrm>
-            <a:off x="8610480" y="6356520"/>
-            <a:ext cx="2742480" cy="364320"/>
-          </a:xfrm>
-          <a:prstGeom prst="rect">
-            <a:avLst/>
-          </a:prstGeom>
-          <a:noFill/>
-          <a:ln w="0">
-            <a:noFill/>
-          </a:ln>
-        </p:spPr>
-        <p:style>
-          <a:lnRef idx="0"/>
-          <a:fillRef idx="0"/>
-          <a:effectRef idx="0"/>
-          <a:fontRef idx="minor"/>
-        </p:style>
-        <p:txBody>
-          <a:bodyPr lIns="90000" rIns="90000" tIns="45000" bIns="45000" anchor="ctr">
-            <a:noAutofit/>
-          </a:bodyPr>
-          <a:p>
-            <a:pPr algn="r">
-              <a:lnSpc>
-                <a:spcPct val="100000"/>
-              </a:lnSpc>
-            </a:pPr>
-            <a:fld id="{8038345F-30E8-45EF-9DB1-FAE85A54B79D}" type="slidenum">
-              <a:rPr b="0" lang="en-US" sz="1200" spc="-1" strike="noStrike">
-                <a:solidFill>
-                  <a:srgbClr val="8b8b8b"/>
-                </a:solidFill>
-                <a:latin typeface="Calibri"/>
-                <a:ea typeface="DejaVu Sans"/>
-              </a:rPr>
-              <a:t>3</a:t>
-            </a:fld>
-            <a:endParaRPr b="0" lang="en-US" sz="1200" spc="-1" strike="noStrike">
               <a:latin typeface="Arial"/>
             </a:endParaRPr>
           </a:p>
@@ -8386,14 +8550,14 @@
       </p:grpSpPr>
       <p:sp>
         <p:nvSpPr>
-          <p:cNvPr id="160" name="CustomShape 1"/>
+          <p:cNvPr id="162" name="CustomShape 1"/>
           <p:cNvSpPr/>
           <p:nvPr/>
         </p:nvSpPr>
         <p:spPr>
           <a:xfrm>
             <a:off x="990720" y="1558080"/>
-            <a:ext cx="10708920" cy="5130000"/>
+            <a:ext cx="10708560" cy="5129640"/>
           </a:xfrm>
           <a:prstGeom prst="rect">
             <a:avLst/>
@@ -8414,7 +8578,7 @@
             <a:noAutofit/>
           </a:bodyPr>
           <a:p>
-            <a:pPr marL="228600" indent="-227880">
+            <a:pPr marL="228600" indent="-227520">
               <a:lnSpc>
                 <a:spcPct val="100000"/>
               </a:lnSpc>
@@ -8433,6 +8597,7 @@
                   <a:srgbClr val="000000"/>
                 </a:solidFill>
                 <a:latin typeface="Calibri"/>
+                <a:ea typeface="DejaVu Sans"/>
               </a:rPr>
               <a:t>Clarification of open issues stated in the draft (currently no open issues on the </a:t>
             </a:r>
@@ -8443,6 +8608,7 @@
                 </a:solidFill>
                 <a:uFillTx/>
                 <a:latin typeface="Calibri"/>
+                <a:ea typeface="DejaVu Sans"/>
                 <a:hlinkClick r:id="rId1"/>
               </a:rPr>
               <a:t>ANIMA git</a:t>
@@ -8453,6 +8619,7 @@
                   <a:srgbClr val="000000"/>
                 </a:solidFill>
                 <a:latin typeface="Calibri"/>
+                <a:ea typeface="DejaVu Sans"/>
               </a:rPr>
               <a:t>):</a:t>
             </a:r>
@@ -8461,7 +8628,7 @@
             </a:endParaRPr>
           </a:p>
           <a:p>
-            <a:pPr lvl="1" marL="685800" indent="-227880">
+            <a:pPr lvl="1" marL="685800" indent="-227520">
               <a:lnSpc>
                 <a:spcPct val="100000"/>
               </a:lnSpc>
@@ -8480,6 +8647,7 @@
                   <a:srgbClr val="000000"/>
                 </a:solidFill>
                 <a:latin typeface="Calibri"/>
+                <a:ea typeface="DejaVu Sans"/>
               </a:rPr>
               <a:t>Application of Lightweight CMP Profile: some details to be clarified/defined</a:t>
             </a:r>
@@ -8488,7 +8656,7 @@
             </a:endParaRPr>
           </a:p>
           <a:p>
-            <a:pPr marL="900000" indent="-227880">
+            <a:pPr marL="900000" indent="-227520">
               <a:lnSpc>
                 <a:spcPct val="80000"/>
               </a:lnSpc>
@@ -8510,8 +8678,69 @@
                   <a:srgbClr val="000000"/>
                 </a:solidFill>
                 <a:latin typeface="Calibri"/>
-              </a:rPr>
-              <a:t>Whether to use /getcacerts or the caPubs and extraCerts fields </a:t>
+                <a:ea typeface="DejaVu Sans"/>
+              </a:rPr>
+              <a:t>Whether to use </a:t>
+            </a:r>
+            <a:r>
+              <a:rPr b="0" lang="en-US" sz="2000" spc="-1" strike="noStrike">
+                <a:solidFill>
+                  <a:srgbClr val="000000"/>
+                </a:solidFill>
+                <a:latin typeface="FreeMono"/>
+                <a:ea typeface="DejaVu Sans"/>
+              </a:rPr>
+              <a:t>/getcacerts</a:t>
+            </a:r>
+            <a:r>
+              <a:rPr b="0" lang="en-US" sz="2000" spc="-1" strike="noStrike">
+                <a:solidFill>
+                  <a:srgbClr val="000000"/>
+                </a:solidFill>
+                <a:latin typeface="Calibri"/>
+                <a:ea typeface="DejaVu Sans"/>
+              </a:rPr>
+              <a:t> or the </a:t>
+            </a:r>
+            <a:r>
+              <a:rPr b="0" lang="en-US" sz="2000" spc="-1" strike="noStrike">
+                <a:solidFill>
+                  <a:srgbClr val="000000"/>
+                </a:solidFill>
+                <a:latin typeface="FreeMono"/>
+                <a:ea typeface="DejaVu Sans"/>
+              </a:rPr>
+              <a:t>caPubs</a:t>
+            </a:r>
+            <a:r>
+              <a:rPr b="0" lang="en-US" sz="2000" spc="-1" strike="noStrike">
+                <a:solidFill>
+                  <a:srgbClr val="000000"/>
+                </a:solidFill>
+                <a:latin typeface="Calibri"/>
+                <a:ea typeface="DejaVu Sans"/>
+              </a:rPr>
+              <a:t> and </a:t>
+            </a:r>
+            <a:r>
+              <a:rPr b="0" lang="en-US" sz="2000" spc="-1" strike="noStrike">
+                <a:solidFill>
+                  <a:srgbClr val="000000"/>
+                </a:solidFill>
+                <a:latin typeface="FreeMono"/>
+                <a:ea typeface="DejaVu Sans"/>
+              </a:rPr>
+              <a:t>extraCerts</a:t>
+            </a:r>
+            <a:r>
+              <a:rPr b="0" lang="en-US" sz="2000" spc="-1" strike="noStrike">
+                <a:solidFill>
+                  <a:srgbClr val="000000"/>
+                </a:solidFill>
+                <a:latin typeface="Calibri"/>
+                <a:ea typeface="DejaVu Sans"/>
+              </a:rPr>
+              <a:t> fields </a:t>
             </a:r>
             <a:br/>
             <a:r>
@@ -8520,6 +8749,7 @@
                   <a:srgbClr val="000000"/>
                 </a:solidFill>
                 <a:latin typeface="Calibri"/>
+                <a:ea typeface="DejaVu Sans"/>
               </a:rPr>
               <a:t>when further to-be-trusted (root CA) certificates and possibly other CA certs are needed</a:t>
             </a:r>
@@ -8528,7 +8758,7 @@
             </a:endParaRPr>
           </a:p>
           <a:p>
-            <a:pPr marL="900000" indent="-227880">
+            <a:pPr marL="900000" indent="-227520">
               <a:lnSpc>
                 <a:spcPct val="80000"/>
               </a:lnSpc>
@@ -8550,8 +8780,29 @@
                   <a:srgbClr val="000000"/>
                 </a:solidFill>
                 <a:latin typeface="Calibri"/>
-              </a:rPr>
-              <a:t>Whether to use /getcertreqtemplate </a:t>
+                <a:ea typeface="DejaVu Sans"/>
+              </a:rPr>
+              <a:t>Whether to use </a:t>
+            </a:r>
+            <a:r>
+              <a:rPr b="0" lang="en-US" sz="2000" spc="-1" strike="noStrike">
+                <a:solidFill>
+                  <a:srgbClr val="000000"/>
+                </a:solidFill>
+                <a:latin typeface="FreeMono"/>
+                <a:ea typeface="DejaVu Sans"/>
+              </a:rPr>
+              <a:t>/getcertreqtemplate</a:t>
+            </a:r>
+            <a:r>
+              <a:rPr b="0" lang="en-US" sz="2000" spc="-1" strike="noStrike">
+                <a:solidFill>
+                  <a:srgbClr val="000000"/>
+                </a:solidFill>
+                <a:latin typeface="Calibri"/>
+                <a:ea typeface="DejaVu Sans"/>
+              </a:rPr>
+              <a:t> </a:t>
             </a:r>
             <a:br/>
             <a:r>
@@ -8560,15 +8811,26 @@
                   <a:srgbClr val="000000"/>
                 </a:solidFill>
                 <a:latin typeface="Calibri"/>
-              </a:rPr>
-              <a:t>or let the registrar modify the CRMF and use raVerified</a:t>
+                <a:ea typeface="DejaVu Sans"/>
+              </a:rPr>
+              <a:t>or let the registrar modify the CRMF and use </a:t>
+            </a:r>
+            <a:r>
+              <a:rPr b="0" lang="en-US" sz="2000" spc="-1" strike="noStrike">
+                <a:solidFill>
+                  <a:srgbClr val="000000"/>
+                </a:solidFill>
+                <a:latin typeface="FreeMono"/>
+                <a:ea typeface="DejaVu Sans"/>
+              </a:rPr>
+              <a:t>raVerified</a:t>
             </a:r>
             <a:endParaRPr b="0" lang="en-US" sz="2000" spc="-1" strike="noStrike">
               <a:latin typeface="Arial"/>
             </a:endParaRPr>
           </a:p>
           <a:p>
-            <a:pPr marL="900000" indent="-227880">
+            <a:pPr marL="900000" indent="-227520">
               <a:lnSpc>
                 <a:spcPct val="80000"/>
               </a:lnSpc>
@@ -8590,15 +8852,46 @@
                   <a:srgbClr val="000000"/>
                 </a:solidFill>
                 <a:latin typeface="Calibri"/>
-              </a:rPr>
-              <a:t>Specify the optional use of implicitConfirm as alternative to certConf</a:t>
+                <a:ea typeface="DejaVu Sans"/>
+              </a:rPr>
+              <a:t>Specify the optional use of </a:t>
+            </a:r>
+            <a:r>
+              <a:rPr b="0" lang="en-US" sz="2000" spc="-1" strike="noStrike">
+                <a:solidFill>
+                  <a:srgbClr val="000000"/>
+                </a:solidFill>
+                <a:latin typeface="FreeMono"/>
+                <a:ea typeface="DejaVu Sans"/>
+              </a:rPr>
+              <a:t>implicitConfirm</a:t>
+            </a:r>
+            <a:r>
+              <a:rPr b="0" lang="en-US" sz="2000" spc="-1" strike="noStrike">
+                <a:solidFill>
+                  <a:srgbClr val="000000"/>
+                </a:solidFill>
+                <a:latin typeface="Calibri"/>
+                <a:ea typeface="DejaVu Sans"/>
+              </a:rPr>
+              <a:t> as alternative to </a:t>
+            </a:r>
+            <a:r>
+              <a:rPr b="0" lang="en-US" sz="2000" spc="-1" strike="noStrike">
+                <a:solidFill>
+                  <a:srgbClr val="000000"/>
+                </a:solidFill>
+                <a:latin typeface="FreeMono"/>
+                <a:ea typeface="DejaVu Sans"/>
+              </a:rPr>
+              <a:t>certConf</a:t>
             </a:r>
             <a:endParaRPr b="0" lang="en-US" sz="2000" spc="-1" strike="noStrike">
               <a:latin typeface="Arial"/>
             </a:endParaRPr>
           </a:p>
           <a:p>
-            <a:pPr marL="900000" indent="-227880">
+            <a:pPr marL="900000" indent="-227520">
               <a:lnSpc>
                 <a:spcPct val="80000"/>
               </a:lnSpc>
@@ -8620,15 +8913,67 @@
                   <a:srgbClr val="000000"/>
                 </a:solidFill>
                 <a:latin typeface="Calibri"/>
-              </a:rPr>
-              <a:t>Whether to specify the use of /p10</a:t>
+                <a:ea typeface="DejaVu Sans"/>
+              </a:rPr>
+              <a:t>Whether to specify the use of </a:t>
+            </a:r>
+            <a:r>
+              <a:rPr b="0" lang="en-US" sz="2000" spc="-1" strike="noStrike">
+                <a:solidFill>
+                  <a:srgbClr val="000000"/>
+                </a:solidFill>
+                <a:latin typeface="FreeMono"/>
+                <a:ea typeface="DejaVu Sans"/>
+              </a:rPr>
+              <a:t>/p10</a:t>
             </a:r>
             <a:endParaRPr b="0" lang="en-US" sz="2000" spc="-1" strike="noStrike">
               <a:latin typeface="Arial"/>
             </a:endParaRPr>
           </a:p>
           <a:p>
-            <a:pPr lvl="1" marL="685800" indent="-227880">
+            <a:pPr lvl="1" marL="685800" indent="-227520">
+              <a:lnSpc>
+                <a:spcPct val="80000"/>
+              </a:lnSpc>
+              <a:spcBef>
+                <a:spcPts val="1417"/>
+              </a:spcBef>
+              <a:buClr>
+                <a:srgbClr val="000000"/>
+              </a:buClr>
+              <a:buFont typeface="Arial"/>
+              <a:buChar char="•"/>
+              <a:tabLst>
+                <a:tab algn="l" pos="408240"/>
+              </a:tabLst>
+            </a:pPr>
+            <a:r>
+              <a:rPr b="0" lang="en-US" sz="2200" spc="-1" strike="noStrike">
+                <a:solidFill>
+                  <a:srgbClr val="000000"/>
+                </a:solidFill>
+                <a:latin typeface="Calibri"/>
+                <a:ea typeface="DejaVu Sans"/>
+              </a:rPr>
+              <a:t>Application of EST with </a:t>
+            </a:r>
+            <a:r>
+              <a:rPr b="0" lang="en-US" sz="2000" spc="-1" strike="noStrike">
+                <a:solidFill>
+                  <a:srgbClr val="000000"/>
+                </a:solidFill>
+                <a:latin typeface="FreeMono"/>
+                <a:ea typeface="DejaVu Sans"/>
+              </a:rPr>
+              <a:t>/fullCMC</a:t>
+            </a:r>
+            <a:endParaRPr b="0" lang="en-US" sz="2000" spc="-1" strike="noStrike">
+              <a:latin typeface="Arial"/>
+            </a:endParaRPr>
+          </a:p>
+          <a:p>
+            <a:pPr marL="228600" indent="-227520">
               <a:lnSpc>
                 <a:spcPct val="100000"/>
               </a:lnSpc>
@@ -8650,15 +8995,16 @@
                   <a:srgbClr val="000000"/>
                 </a:solidFill>
                 <a:latin typeface="Calibri"/>
-              </a:rPr>
-              <a:t>Application of EST with /fullCMC</a:t>
+                <a:ea typeface="DejaVu Sans"/>
+              </a:rPr>
+              <a:t>Further updates pending to fix the above and potential further issues</a:t>
             </a:r>
             <a:endParaRPr b="0" lang="en-US" sz="2200" spc="-1" strike="noStrike">
               <a:latin typeface="Arial"/>
             </a:endParaRPr>
           </a:p>
           <a:p>
-            <a:pPr marL="228600" indent="-227880">
+            <a:pPr marL="228600" indent="-227520">
               <a:lnSpc>
                 <a:spcPct val="100000"/>
               </a:lnSpc>
@@ -8680,15 +9026,16 @@
                   <a:srgbClr val="000000"/>
                 </a:solidFill>
                 <a:latin typeface="Calibri"/>
-              </a:rPr>
-              <a:t>Further updates to be circulated</a:t>
+                <a:ea typeface="DejaVu Sans"/>
+              </a:rPr>
+              <a:t>WG review appreciated</a:t>
             </a:r>
             <a:endParaRPr b="0" lang="en-US" sz="2200" spc="-1" strike="noStrike">
               <a:latin typeface="Arial"/>
             </a:endParaRPr>
           </a:p>
           <a:p>
-            <a:pPr marL="228600" indent="-227880">
+            <a:pPr marL="228600" indent="-227520">
               <a:lnSpc>
                 <a:spcPct val="100000"/>
               </a:lnSpc>
@@ -8710,56 +9057,19 @@
                   <a:srgbClr val="000000"/>
                 </a:solidFill>
                 <a:latin typeface="Calibri"/>
-              </a:rPr>
-              <a:t>WG review appreciated</a:t>
-            </a:r>
-            <a:endParaRPr b="0" lang="en-US" sz="2200" spc="-1" strike="noStrike">
-              <a:latin typeface="Arial"/>
-            </a:endParaRPr>
-          </a:p>
-          <a:p>
-            <a:pPr marL="228600" indent="-227880">
-              <a:lnSpc>
-                <a:spcPct val="100000"/>
-              </a:lnSpc>
-              <a:spcBef>
-                <a:spcPts val="601"/>
-              </a:spcBef>
-              <a:buClr>
-                <a:srgbClr val="000000"/>
-              </a:buClr>
-              <a:buFont typeface="Arial"/>
-              <a:buChar char="•"/>
-              <a:tabLst>
-                <a:tab algn="l" pos="408240"/>
-              </a:tabLst>
-            </a:pPr>
+                <a:ea typeface="DejaVu Sans"/>
+              </a:rPr>
+              <a:t>PoC implementation ongoing; please email</a:t>
+            </a:r>
             <a:r>
               <a:rPr b="0" lang="en-US" sz="2200" spc="-1" strike="noStrike">
                 <a:solidFill>
                   <a:srgbClr val="000000"/>
                 </a:solidFill>
                 <a:latin typeface="Calibri"/>
-              </a:rPr>
-              <a:t>PoC implementation ongoing –  </a:t>
-            </a:r>
-            <a:r>
-              <a:rPr b="0" lang="en-US" sz="2200" spc="-1" strike="noStrike">
-                <a:solidFill>
-                  <a:srgbClr val="000000"/>
-                </a:solidFill>
-                <a:latin typeface="Wingdings"/>
-              </a:rPr>
-              <a:t></a:t>
-            </a:r>
-            <a:r>
-              <a:rPr b="0" lang="en-US" sz="2200" spc="-1" strike="noStrike">
-                <a:solidFill>
-                  <a:srgbClr val="000000"/>
-                </a:solidFill>
-                <a:latin typeface="Calibri"/>
-              </a:rPr>
-              <a:t> us you are interested in interop testing</a:t>
+                <a:ea typeface="DejaVu Sans"/>
+              </a:rPr>
+              <a:t> us if you are interested in interop testing</a:t>
             </a:r>
             <a:endParaRPr b="0" lang="en-US" sz="2200" spc="-1" strike="noStrike">
               <a:latin typeface="Arial"/>
@@ -8801,14 +9111,14 @@
       </p:sp>
       <p:sp>
         <p:nvSpPr>
-          <p:cNvPr id="161" name="CustomShape 2"/>
+          <p:cNvPr id="163" name="CustomShape 2"/>
           <p:cNvSpPr/>
           <p:nvPr/>
         </p:nvSpPr>
         <p:spPr>
           <a:xfrm>
-            <a:off x="990720" y="6508800"/>
-            <a:ext cx="2742480" cy="364320"/>
+            <a:off x="838080" y="365040"/>
+            <a:ext cx="10514520" cy="1324440"/>
           </a:xfrm>
           <a:prstGeom prst="rect">
             <a:avLst/>
@@ -8826,108 +9136,6 @@
         </p:style>
         <p:txBody>
           <a:bodyPr lIns="90000" rIns="90000" tIns="45000" bIns="45000" anchor="ctr">
-            <a:noAutofit/>
-          </a:bodyPr>
-          <a:p>
-            <a:pPr>
-              <a:lnSpc>
-                <a:spcPct val="100000"/>
-              </a:lnSpc>
-            </a:pPr>
-            <a:fld id="{C7267821-CB88-4F1E-BAD2-6DC0D04A21FC}" type="datetime">
-              <a:rPr b="0" lang="en-US" sz="1200" spc="-1" strike="noStrike">
-                <a:solidFill>
-                  <a:srgbClr val="8b8b8b"/>
-                </a:solidFill>
-                <a:latin typeface="Calibri"/>
-                <a:ea typeface="DejaVu Sans"/>
-              </a:rPr>
-              <a:t>3/10/22</a:t>
-            </a:fld>
-            <a:endParaRPr b="0" lang="en-US" sz="1200" spc="-1" strike="noStrike">
-              <a:latin typeface="Arial"/>
-            </a:endParaRPr>
-          </a:p>
-        </p:txBody>
-      </p:sp>
-      <p:sp>
-        <p:nvSpPr>
-          <p:cNvPr id="162" name="CustomShape 3"/>
-          <p:cNvSpPr/>
-          <p:nvPr/>
-        </p:nvSpPr>
-        <p:spPr>
-          <a:xfrm>
-            <a:off x="8763120" y="6508800"/>
-            <a:ext cx="2742480" cy="364320"/>
-          </a:xfrm>
-          <a:prstGeom prst="rect">
-            <a:avLst/>
-          </a:prstGeom>
-          <a:noFill/>
-          <a:ln w="0">
-            <a:noFill/>
-          </a:ln>
-        </p:spPr>
-        <p:style>
-          <a:lnRef idx="0"/>
-          <a:fillRef idx="0"/>
-          <a:effectRef idx="0"/>
-          <a:fontRef idx="minor"/>
-        </p:style>
-        <p:txBody>
-          <a:bodyPr lIns="90000" rIns="90000" tIns="45000" bIns="45000" anchor="ctr">
-            <a:noAutofit/>
-          </a:bodyPr>
-          <a:p>
-            <a:pPr algn="r">
-              <a:lnSpc>
-                <a:spcPct val="100000"/>
-              </a:lnSpc>
-            </a:pPr>
-            <a:fld id="{7DFC533F-8E83-451D-9D20-6436F3B3711D}" type="slidenum">
-              <a:rPr b="0" lang="en-US" sz="1200" spc="-1" strike="noStrike">
-                <a:solidFill>
-                  <a:srgbClr val="8b8b8b"/>
-                </a:solidFill>
-                <a:latin typeface="Calibri"/>
-                <a:ea typeface="DejaVu Sans"/>
-              </a:rPr>
-              <a:t>3</a:t>
-            </a:fld>
-            <a:endParaRPr b="0" lang="en-US" sz="1200" spc="-1" strike="noStrike">
-              <a:latin typeface="Arial"/>
-            </a:endParaRPr>
-          </a:p>
-        </p:txBody>
-      </p:sp>
-      <p:sp>
-        <p:nvSpPr>
-          <p:cNvPr id="163" name="CustomShape 4"/>
-          <p:cNvSpPr/>
-          <p:nvPr/>
-        </p:nvSpPr>
-        <p:spPr>
-          <a:xfrm>
-            <a:off x="838080" y="365040"/>
-            <a:ext cx="10514880" cy="1324800"/>
-          </a:xfrm>
-          <a:prstGeom prst="rect">
-            <a:avLst/>
-          </a:prstGeom>
-          <a:noFill/>
-          <a:ln w="0">
-            <a:noFill/>
-          </a:ln>
-        </p:spPr>
-        <p:style>
-          <a:lnRef idx="0"/>
-          <a:fillRef idx="0"/>
-          <a:effectRef idx="0"/>
-          <a:fontRef idx="minor"/>
-        </p:style>
-        <p:txBody>
-          <a:bodyPr lIns="90000" rIns="90000" tIns="45000" bIns="45000" anchor="ctr">
             <a:normAutofit/>
           </a:bodyPr>
           <a:p>
@@ -8942,6 +9150,7 @@
                   <a:srgbClr val="000000"/>
                 </a:solidFill>
                 <a:latin typeface="Calibri Light"/>
+                <a:ea typeface="DejaVu Sans"/>
               </a:rPr>
               <a:t>BRSKI-AE status: next steps</a:t>
             </a:r>

</xml_diff>